<commit_message>
Correção de Artefatos 1 a 6 e Upload de 15 a 22
</commit_message>
<xml_diff>
--- a/Artefatos/16. DFD ESSENCIAL CAPACIDADES.pptx
+++ b/Artefatos/16. DFD ESSENCIAL CAPACIDADES.pptx
@@ -2,17 +2,13 @@
 <file path=ppt/presentation.xml><?xml version="1.0" encoding="utf-8"?>
 <p:presentation xmlns:a="http://schemas.openxmlformats.org/drawingml/2006/main" xmlns:r="http://schemas.openxmlformats.org/officeDocument/2006/relationships" xmlns:mc="http://schemas.openxmlformats.org/markup-compatibility/2006" xmlns:mv="urn:schemas-microsoft-com:mac:vml" xmlns:p="http://schemas.openxmlformats.org/presentationml/2006/main" xmlns:c="http://schemas.openxmlformats.org/drawingml/2006/chart" xmlns:dgm="http://schemas.openxmlformats.org/drawingml/2006/diagram" xmlns:o="urn:schemas-microsoft-com:office:office" xmlns:v="urn:schemas-microsoft-com:vml" xmlns:pvml="urn:schemas-microsoft-com:office:powerpoint" xmlns:com="http://schemas.openxmlformats.org/drawingml/2006/compatibility" xmlns:p14="http://schemas.microsoft.com/office/powerpoint/2010/main" xmlns:p15="http://schemas.microsoft.com/office/powerpoint/2012/main" xmlns:ahyp="http://schemas.microsoft.com/office/drawing/2018/hyperlinkcolor" autoCompressPictures="0" strictFirstAndLastChars="0" saveSubsetFonts="1">
   <p:sldMasterIdLst>
-    <p:sldMasterId id="2147483648" r:id="rId4"/>
+    <p:sldMasterId id="2147483659" r:id="rId4"/>
   </p:sldMasterIdLst>
   <p:notesMasterIdLst>
     <p:notesMasterId r:id="rId5"/>
   </p:notesMasterIdLst>
   <p:sldIdLst>
     <p:sldId id="256" r:id="rId6"/>
-    <p:sldId id="257" r:id="rId7"/>
-    <p:sldId id="258" r:id="rId8"/>
-    <p:sldId id="259" r:id="rId9"/>
-    <p:sldId id="260" r:id="rId10"/>
   </p:sldIdLst>
   <p:sldSz cy="5143500" cx="9144000"/>
   <p:notesSz cx="6858000" cy="9144000"/>
@@ -259,9 +255,6 @@
           </p15:clr>
         </p15:guide>
       </p15:sldGuideLst>
-    </p:ext>
-    <p:ext uri="http://customooxmlschemas.google.com/">
-      <go:slidesCustomData xmlns:go="http://customooxmlschemas.google.com/" r:id="rId11" roundtripDataSignature="AMtx7mg6AFntJ9h5uoAGxH+GGsqu2q2GoA=="/>
     </p:ext>
   </p:extLst>
 </p:presentation>
@@ -931,920 +924,7 @@
               <a:buNone/>
             </a:pPr>
             <a:r>
-              <a:rPr lang="pt-BR"/>
-              <a:t>1 - TIRAR A ENTREGA E DEIXAR DOCUMENTOS E CURSOS DESEJADOS;</a:t>
-            </a:r>
-            <a:endParaRPr/>
-          </a:p>
-          <a:p>
-            <a:pPr indent="0" lvl="0" marL="0" rtl="0" algn="l">
-              <a:lnSpc>
-                <a:spcPct val="100000"/>
-              </a:lnSpc>
-              <a:spcBef>
-                <a:spcPts val="0"/>
-              </a:spcBef>
-              <a:spcAft>
-                <a:spcPts val="0"/>
-              </a:spcAft>
-              <a:buSzPts val="1100"/>
-              <a:buNone/>
-            </a:pPr>
-            <a:r>
-              <a:rPr lang="pt-BR"/>
-              <a:t># Observação = 2 - TIRAR ANALISAR DOCUMENTOS E DEIXAR REALIZAR MATRICULA;</a:t>
-            </a:r>
-            <a:endParaRPr/>
-          </a:p>
-          <a:p>
-            <a:pPr indent="0" lvl="0" marL="0" rtl="0" algn="l">
-              <a:lnSpc>
-                <a:spcPct val="100000"/>
-              </a:lnSpc>
-              <a:spcBef>
-                <a:spcPts val="0"/>
-              </a:spcBef>
-              <a:spcAft>
-                <a:spcPts val="0"/>
-              </a:spcAft>
-              <a:buSzPts val="1100"/>
-              <a:buNone/>
-            </a:pPr>
-            <a:r>
-              <a:rPr lang="pt-BR"/>
-              <a:t>3 - CRIAR UM DEPÓSITO DE DADOS MATRÍCULA.</a:t>
-            </a:r>
-            <a:endParaRPr/>
-          </a:p>
-        </p:txBody>
-      </p:sp>
-    </p:spTree>
-  </p:cSld>
-  <p:clrMapOvr>
-    <a:masterClrMapping/>
-  </p:clrMapOvr>
-</p:notes>
-</file>
-
-<file path=ppt/notesSlides/notesSlide2.xml><?xml version="1.0" encoding="utf-8"?>
-<p:notes xmlns:a="http://schemas.openxmlformats.org/drawingml/2006/main" xmlns:r="http://schemas.openxmlformats.org/officeDocument/2006/relationships" xmlns:mc="http://schemas.openxmlformats.org/markup-compatibility/2006" xmlns:mv="urn:schemas-microsoft-com:mac:vml" xmlns:p="http://schemas.openxmlformats.org/presentationml/2006/main" xmlns:c="http://schemas.openxmlformats.org/drawingml/2006/chart" xmlns:dgm="http://schemas.openxmlformats.org/drawingml/2006/diagram" xmlns:o="urn:schemas-microsoft-com:office:office" xmlns:v="urn:schemas-microsoft-com:vml" xmlns:pvml="urn:schemas-microsoft-com:office:powerpoint" xmlns:com="http://schemas.openxmlformats.org/drawingml/2006/compatibility" xmlns:p14="http://schemas.microsoft.com/office/powerpoint/2010/main" xmlns:p15="http://schemas.microsoft.com/office/powerpoint/2012/main" xmlns:ahyp="http://schemas.microsoft.com/office/drawing/2018/hyperlinkcolor" showMasterPhAnim="0" showMasterSp="0">
-  <p:cSld>
-    <p:spTree>
-      <p:nvGrpSpPr>
-        <p:cNvPr id="56" name="Shape 56"/>
-        <p:cNvGrpSpPr/>
-        <p:nvPr/>
-      </p:nvGrpSpPr>
-      <p:grpSpPr>
-        <a:xfrm>
-          <a:off x="0" y="0"/>
-          <a:ext cx="0" cy="0"/>
-          <a:chOff x="0" y="0"/>
-          <a:chExt cx="0" cy="0"/>
-        </a:xfrm>
-      </p:grpSpPr>
-      <p:sp>
-        <p:nvSpPr>
-          <p:cNvPr id="57" name="Google Shape;57;p4:notes"/>
-          <p:cNvSpPr/>
-          <p:nvPr>
-            <p:ph idx="2" type="sldImg"/>
-          </p:nvPr>
-        </p:nvSpPr>
-        <p:spPr>
-          <a:xfrm>
-            <a:off x="381300" y="685800"/>
-            <a:ext cx="6096000" cy="3429000"/>
-          </a:xfrm>
-          <a:custGeom>
-            <a:rect b="b" l="l" r="r" t="t"/>
-            <a:pathLst>
-              <a:path extrusionOk="0" h="120000" w="120000">
-                <a:moveTo>
-                  <a:pt x="0" y="0"/>
-                </a:moveTo>
-                <a:lnTo>
-                  <a:pt x="120000" y="0"/>
-                </a:lnTo>
-                <a:lnTo>
-                  <a:pt x="120000" y="120000"/>
-                </a:lnTo>
-                <a:lnTo>
-                  <a:pt x="0" y="120000"/>
-                </a:lnTo>
-                <a:close/>
-              </a:path>
-            </a:pathLst>
-          </a:custGeom>
-          <a:noFill/>
-          <a:ln cap="flat" cmpd="sng" w="9525">
-            <a:solidFill>
-              <a:srgbClr val="000000"/>
-            </a:solidFill>
-            <a:prstDash val="solid"/>
-            <a:round/>
-            <a:headEnd len="sm" w="sm" type="none"/>
-            <a:tailEnd len="sm" w="sm" type="none"/>
-          </a:ln>
-        </p:spPr>
-      </p:sp>
-      <p:sp>
-        <p:nvSpPr>
-          <p:cNvPr id="58" name="Google Shape;58;p4:notes"/>
-          <p:cNvSpPr txBox="1"/>
-          <p:nvPr>
-            <p:ph idx="1" type="body"/>
-          </p:nvPr>
-        </p:nvSpPr>
-        <p:spPr>
-          <a:xfrm>
-            <a:off x="685800" y="4343400"/>
-            <a:ext cx="5486400" cy="4114800"/>
-          </a:xfrm>
-          <a:prstGeom prst="rect">
-            <a:avLst/>
-          </a:prstGeom>
-          <a:noFill/>
-          <a:ln>
-            <a:noFill/>
-          </a:ln>
-        </p:spPr>
-        <p:txBody>
-          <a:bodyPr anchorCtr="0" anchor="t" bIns="91425" lIns="91425" spcFirstLastPara="1" rIns="91425" wrap="square" tIns="91425">
-            <a:noAutofit/>
-          </a:bodyPr>
-          <a:lstStyle/>
-          <a:p>
-            <a:pPr indent="0" lvl="0" marL="0" rtl="0" algn="l">
-              <a:lnSpc>
-                <a:spcPct val="100000"/>
-              </a:lnSpc>
-              <a:spcBef>
-                <a:spcPts val="0"/>
-              </a:spcBef>
-              <a:spcAft>
-                <a:spcPts val="0"/>
-              </a:spcAft>
-              <a:buSzPts val="1100"/>
-              <a:buNone/>
-            </a:pPr>
-            <a:r>
-              <a:rPr lang="pt-BR"/>
-              <a:t>1 - RETIRAR SOLICITA POR SOLICITAÇÃO;</a:t>
-            </a:r>
-            <a:endParaRPr/>
-          </a:p>
-          <a:p>
-            <a:pPr indent="0" lvl="0" marL="0" rtl="0" algn="l">
-              <a:lnSpc>
-                <a:spcPct val="100000"/>
-              </a:lnSpc>
-              <a:spcBef>
-                <a:spcPts val="0"/>
-              </a:spcBef>
-              <a:spcAft>
-                <a:spcPts val="0"/>
-              </a:spcAft>
-              <a:buSzPts val="1100"/>
-              <a:buNone/>
-            </a:pPr>
-            <a:r>
-              <a:rPr lang="pt-BR"/>
-              <a:t>2 - RETIRAR INFORMA PROTOCOLO POR PROTOCOLO DE ATENDIMENTO;</a:t>
-            </a:r>
-            <a:endParaRPr/>
-          </a:p>
-          <a:p>
-            <a:pPr indent="0" lvl="0" marL="0" rtl="0" algn="l">
-              <a:lnSpc>
-                <a:spcPct val="100000"/>
-              </a:lnSpc>
-              <a:spcBef>
-                <a:spcPts val="0"/>
-              </a:spcBef>
-              <a:spcAft>
-                <a:spcPts val="0"/>
-              </a:spcAft>
-              <a:buSzPts val="1100"/>
-              <a:buNone/>
-            </a:pPr>
-            <a:r>
-              <a:rPr lang="pt-BR"/>
-              <a:t>3 - CRIAR UM DEPÓSITO DE DADOS SOLICITAÇÃO DE REABERTURA DE MATRÍCULA;</a:t>
-            </a:r>
-            <a:endParaRPr/>
-          </a:p>
-          <a:p>
-            <a:pPr indent="0" lvl="0" marL="0" rtl="0" algn="l">
-              <a:lnSpc>
-                <a:spcPct val="100000"/>
-              </a:lnSpc>
-              <a:spcBef>
-                <a:spcPts val="0"/>
-              </a:spcBef>
-              <a:spcAft>
-                <a:spcPts val="0"/>
-              </a:spcAft>
-              <a:buSzPts val="1100"/>
-              <a:buNone/>
-            </a:pPr>
-            <a:r>
-              <a:rPr lang="pt-BR"/>
-              <a:t>4 - TIRAR INFORMA E DEIXAR COBRANÇA E MENSALIDADE + DATA + TURMA;</a:t>
-            </a:r>
-            <a:endParaRPr/>
-          </a:p>
-          <a:p>
-            <a:pPr indent="0" lvl="0" marL="0" rtl="0" algn="l">
-              <a:lnSpc>
-                <a:spcPct val="100000"/>
-              </a:lnSpc>
-              <a:spcBef>
-                <a:spcPts val="0"/>
-              </a:spcBef>
-              <a:spcAft>
-                <a:spcPts val="0"/>
-              </a:spcAft>
-              <a:buSzPts val="1100"/>
-              <a:buNone/>
-            </a:pPr>
-            <a:r>
-              <a:rPr lang="pt-BR"/>
-              <a:t>5 -  TROCAR FINANCEIRO POR CONTAS A RECEBER;</a:t>
-            </a:r>
-            <a:endParaRPr/>
-          </a:p>
-          <a:p>
-            <a:pPr indent="0" lvl="0" marL="0" rtl="0" algn="l">
-              <a:lnSpc>
-                <a:spcPct val="100000"/>
-              </a:lnSpc>
-              <a:spcBef>
-                <a:spcPts val="0"/>
-              </a:spcBef>
-              <a:spcAft>
-                <a:spcPts val="0"/>
-              </a:spcAft>
-              <a:buSzPts val="1100"/>
-              <a:buNone/>
-            </a:pPr>
-            <a:r>
-              <a:rPr lang="pt-BR"/>
-              <a:t>7 - CRIAR UM DEPÓSITO DE DADOS MATRÍCULA;</a:t>
-            </a:r>
-            <a:endParaRPr/>
-          </a:p>
-          <a:p>
-            <a:pPr indent="0" lvl="0" marL="0" rtl="0" algn="l">
-              <a:lnSpc>
-                <a:spcPct val="100000"/>
-              </a:lnSpc>
-              <a:spcBef>
-                <a:spcPts val="0"/>
-              </a:spcBef>
-              <a:spcAft>
-                <a:spcPts val="0"/>
-              </a:spcAft>
-              <a:buSzPts val="1100"/>
-              <a:buNone/>
-            </a:pPr>
-            <a:r>
               <a:t/>
-            </a:r>
-            <a:endParaRPr/>
-          </a:p>
-        </p:txBody>
-      </p:sp>
-    </p:spTree>
-  </p:cSld>
-  <p:clrMapOvr>
-    <a:masterClrMapping/>
-  </p:clrMapOvr>
-</p:notes>
-</file>
-
-<file path=ppt/notesSlides/notesSlide3.xml><?xml version="1.0" encoding="utf-8"?>
-<p:notes xmlns:a="http://schemas.openxmlformats.org/drawingml/2006/main" xmlns:r="http://schemas.openxmlformats.org/officeDocument/2006/relationships" xmlns:mc="http://schemas.openxmlformats.org/markup-compatibility/2006" xmlns:mv="urn:schemas-microsoft-com:mac:vml" xmlns:p="http://schemas.openxmlformats.org/presentationml/2006/main" xmlns:c="http://schemas.openxmlformats.org/drawingml/2006/chart" xmlns:dgm="http://schemas.openxmlformats.org/drawingml/2006/diagram" xmlns:o="urn:schemas-microsoft-com:office:office" xmlns:v="urn:schemas-microsoft-com:vml" xmlns:pvml="urn:schemas-microsoft-com:office:powerpoint" xmlns:com="http://schemas.openxmlformats.org/drawingml/2006/compatibility" xmlns:p14="http://schemas.microsoft.com/office/powerpoint/2010/main" xmlns:p15="http://schemas.microsoft.com/office/powerpoint/2012/main" xmlns:ahyp="http://schemas.microsoft.com/office/drawing/2018/hyperlinkcolor" showMasterPhAnim="0" showMasterSp="0">
-  <p:cSld>
-    <p:spTree>
-      <p:nvGrpSpPr>
-        <p:cNvPr id="62" name="Shape 62"/>
-        <p:cNvGrpSpPr/>
-        <p:nvPr/>
-      </p:nvGrpSpPr>
-      <p:grpSpPr>
-        <a:xfrm>
-          <a:off x="0" y="0"/>
-          <a:ext cx="0" cy="0"/>
-          <a:chOff x="0" y="0"/>
-          <a:chExt cx="0" cy="0"/>
-        </a:xfrm>
-      </p:grpSpPr>
-      <p:sp>
-        <p:nvSpPr>
-          <p:cNvPr id="63" name="Google Shape;63;p2:notes"/>
-          <p:cNvSpPr/>
-          <p:nvPr>
-            <p:ph idx="2" type="sldImg"/>
-          </p:nvPr>
-        </p:nvSpPr>
-        <p:spPr>
-          <a:xfrm>
-            <a:off x="381300" y="685800"/>
-            <a:ext cx="6096000" cy="3429000"/>
-          </a:xfrm>
-          <a:custGeom>
-            <a:rect b="b" l="l" r="r" t="t"/>
-            <a:pathLst>
-              <a:path extrusionOk="0" h="120000" w="120000">
-                <a:moveTo>
-                  <a:pt x="0" y="0"/>
-                </a:moveTo>
-                <a:lnTo>
-                  <a:pt x="120000" y="0"/>
-                </a:lnTo>
-                <a:lnTo>
-                  <a:pt x="120000" y="120000"/>
-                </a:lnTo>
-                <a:lnTo>
-                  <a:pt x="0" y="120000"/>
-                </a:lnTo>
-                <a:close/>
-              </a:path>
-            </a:pathLst>
-          </a:custGeom>
-          <a:noFill/>
-          <a:ln cap="flat" cmpd="sng" w="9525">
-            <a:solidFill>
-              <a:srgbClr val="000000"/>
-            </a:solidFill>
-            <a:prstDash val="solid"/>
-            <a:round/>
-            <a:headEnd len="sm" w="sm" type="none"/>
-            <a:tailEnd len="sm" w="sm" type="none"/>
-          </a:ln>
-        </p:spPr>
-      </p:sp>
-      <p:sp>
-        <p:nvSpPr>
-          <p:cNvPr id="64" name="Google Shape;64;p2:notes"/>
-          <p:cNvSpPr txBox="1"/>
-          <p:nvPr>
-            <p:ph idx="1" type="body"/>
-          </p:nvPr>
-        </p:nvSpPr>
-        <p:spPr>
-          <a:xfrm>
-            <a:off x="685800" y="4343400"/>
-            <a:ext cx="5486400" cy="4114800"/>
-          </a:xfrm>
-          <a:prstGeom prst="rect">
-            <a:avLst/>
-          </a:prstGeom>
-          <a:noFill/>
-          <a:ln>
-            <a:noFill/>
-          </a:ln>
-        </p:spPr>
-        <p:txBody>
-          <a:bodyPr anchorCtr="0" anchor="t" bIns="91425" lIns="91425" spcFirstLastPara="1" rIns="91425" wrap="square" tIns="91425">
-            <a:noAutofit/>
-          </a:bodyPr>
-          <a:lstStyle/>
-          <a:p>
-            <a:pPr indent="0" lvl="0" marL="0" rtl="0" algn="l">
-              <a:lnSpc>
-                <a:spcPct val="100000"/>
-              </a:lnSpc>
-              <a:spcBef>
-                <a:spcPts val="0"/>
-              </a:spcBef>
-              <a:spcAft>
-                <a:spcPts val="0"/>
-              </a:spcAft>
-              <a:buSzPts val="1100"/>
-              <a:buNone/>
-            </a:pPr>
-            <a:r>
-              <a:rPr lang="pt-BR"/>
-              <a:t>1 - ALUNO ASSISTE AULA POR AVISO DE PRESENÇA;</a:t>
-            </a:r>
-            <a:endParaRPr/>
-          </a:p>
-          <a:p>
-            <a:pPr indent="0" lvl="0" marL="0" rtl="0" algn="l">
-              <a:lnSpc>
-                <a:spcPct val="100000"/>
-              </a:lnSpc>
-              <a:spcBef>
-                <a:spcPts val="0"/>
-              </a:spcBef>
-              <a:spcAft>
-                <a:spcPts val="0"/>
-              </a:spcAft>
-              <a:buSzPts val="1100"/>
-              <a:buNone/>
-            </a:pPr>
-            <a:r>
-              <a:rPr lang="pt-BR"/>
-              <a:t>2 - CRIAR UM NOVO DEPÓSITO DE DADOS DE PRESENÇA;</a:t>
-            </a:r>
-            <a:endParaRPr/>
-          </a:p>
-          <a:p>
-            <a:pPr indent="0" lvl="0" marL="0" rtl="0" algn="l">
-              <a:lnSpc>
-                <a:spcPct val="100000"/>
-              </a:lnSpc>
-              <a:spcBef>
-                <a:spcPts val="0"/>
-              </a:spcBef>
-              <a:spcAft>
-                <a:spcPts val="0"/>
-              </a:spcAft>
-              <a:buSzPts val="1100"/>
-              <a:buNone/>
-            </a:pPr>
-            <a:r>
-              <a:rPr lang="pt-BR"/>
-              <a:t>3 - CRIAR UM NOVO DEPÓSITO DE DADOS PARA O PROFESSOR;</a:t>
-            </a:r>
-            <a:endParaRPr/>
-          </a:p>
-          <a:p>
-            <a:pPr indent="0" lvl="0" marL="0" rtl="0" algn="l">
-              <a:lnSpc>
-                <a:spcPct val="100000"/>
-              </a:lnSpc>
-              <a:spcBef>
-                <a:spcPts val="0"/>
-              </a:spcBef>
-              <a:spcAft>
-                <a:spcPts val="0"/>
-              </a:spcAft>
-              <a:buSzPts val="1100"/>
-              <a:buNone/>
-            </a:pPr>
-            <a:r>
-              <a:rPr lang="pt-BR"/>
-              <a:t>4 - CRIAR UM FLUXO DE DADOS PARA O ALUNO RECUSA PODERÁ HAVER RECUSA;</a:t>
-            </a:r>
-            <a:endParaRPr/>
-          </a:p>
-          <a:p>
-            <a:pPr indent="0" lvl="0" marL="0" rtl="0" algn="l">
-              <a:lnSpc>
-                <a:spcPct val="100000"/>
-              </a:lnSpc>
-              <a:spcBef>
-                <a:spcPts val="0"/>
-              </a:spcBef>
-              <a:spcAft>
-                <a:spcPts val="0"/>
-              </a:spcAft>
-              <a:buSzPts val="1100"/>
-              <a:buNone/>
-            </a:pPr>
-            <a:r>
-              <a:rPr lang="pt-BR"/>
-              <a:t>5 - CRIAR UM FLUXO DE DADOS PARA A PROVA EM BRANCO;</a:t>
-            </a:r>
-            <a:endParaRPr/>
-          </a:p>
-          <a:p>
-            <a:pPr indent="0" lvl="0" marL="0" rtl="0" algn="l">
-              <a:lnSpc>
-                <a:spcPct val="100000"/>
-              </a:lnSpc>
-              <a:spcBef>
-                <a:spcPts val="0"/>
-              </a:spcBef>
-              <a:spcAft>
-                <a:spcPts val="0"/>
-              </a:spcAft>
-              <a:buSzPts val="1100"/>
-              <a:buNone/>
-            </a:pPr>
-            <a:r>
-              <a:rPr lang="pt-BR"/>
-              <a:t>6 - PROVA;</a:t>
-            </a:r>
-            <a:endParaRPr/>
-          </a:p>
-          <a:p>
-            <a:pPr indent="0" lvl="0" marL="0" rtl="0" algn="l">
-              <a:lnSpc>
-                <a:spcPct val="100000"/>
-              </a:lnSpc>
-              <a:spcBef>
-                <a:spcPts val="0"/>
-              </a:spcBef>
-              <a:spcAft>
-                <a:spcPts val="0"/>
-              </a:spcAft>
-              <a:buSzPts val="1100"/>
-              <a:buNone/>
-            </a:pPr>
-            <a:r>
-              <a:rPr lang="pt-BR"/>
-              <a:t>7 - CRIAR UM DEPÓSITO DE DADOS PROVA;</a:t>
-            </a:r>
-            <a:endParaRPr/>
-          </a:p>
-          <a:p>
-            <a:pPr indent="0" lvl="0" marL="0" rtl="0" algn="l">
-              <a:lnSpc>
-                <a:spcPct val="100000"/>
-              </a:lnSpc>
-              <a:spcBef>
-                <a:spcPts val="0"/>
-              </a:spcBef>
-              <a:spcAft>
-                <a:spcPts val="0"/>
-              </a:spcAft>
-              <a:buSzPts val="1100"/>
-              <a:buNone/>
-            </a:pPr>
-            <a:r>
-              <a:rPr lang="pt-BR"/>
-              <a:t>8 - CRIAR UM DEPÓSITO DE DADOS MATRÍCULA.</a:t>
-            </a:r>
-            <a:endParaRPr/>
-          </a:p>
-        </p:txBody>
-      </p:sp>
-    </p:spTree>
-  </p:cSld>
-  <p:clrMapOvr>
-    <a:masterClrMapping/>
-  </p:clrMapOvr>
-</p:notes>
-</file>
-
-<file path=ppt/notesSlides/notesSlide4.xml><?xml version="1.0" encoding="utf-8"?>
-<p:notes xmlns:a="http://schemas.openxmlformats.org/drawingml/2006/main" xmlns:r="http://schemas.openxmlformats.org/officeDocument/2006/relationships" xmlns:mc="http://schemas.openxmlformats.org/markup-compatibility/2006" xmlns:mv="urn:schemas-microsoft-com:mac:vml" xmlns:p="http://schemas.openxmlformats.org/presentationml/2006/main" xmlns:c="http://schemas.openxmlformats.org/drawingml/2006/chart" xmlns:dgm="http://schemas.openxmlformats.org/drawingml/2006/diagram" xmlns:o="urn:schemas-microsoft-com:office:office" xmlns:v="urn:schemas-microsoft-com:vml" xmlns:pvml="urn:schemas-microsoft-com:office:powerpoint" xmlns:com="http://schemas.openxmlformats.org/drawingml/2006/compatibility" xmlns:p14="http://schemas.microsoft.com/office/powerpoint/2010/main" xmlns:p15="http://schemas.microsoft.com/office/powerpoint/2012/main" xmlns:ahyp="http://schemas.microsoft.com/office/drawing/2018/hyperlinkcolor" showMasterPhAnim="0" showMasterSp="0">
-  <p:cSld>
-    <p:spTree>
-      <p:nvGrpSpPr>
-        <p:cNvPr id="68" name="Shape 68"/>
-        <p:cNvGrpSpPr/>
-        <p:nvPr/>
-      </p:nvGrpSpPr>
-      <p:grpSpPr>
-        <a:xfrm>
-          <a:off x="0" y="0"/>
-          <a:ext cx="0" cy="0"/>
-          <a:chOff x="0" y="0"/>
-          <a:chExt cx="0" cy="0"/>
-        </a:xfrm>
-      </p:grpSpPr>
-      <p:sp>
-        <p:nvSpPr>
-          <p:cNvPr id="69" name="Google Shape;69;p3:notes"/>
-          <p:cNvSpPr/>
-          <p:nvPr>
-            <p:ph idx="2" type="sldImg"/>
-          </p:nvPr>
-        </p:nvSpPr>
-        <p:spPr>
-          <a:xfrm>
-            <a:off x="381300" y="685800"/>
-            <a:ext cx="6096000" cy="3429000"/>
-          </a:xfrm>
-          <a:custGeom>
-            <a:rect b="b" l="l" r="r" t="t"/>
-            <a:pathLst>
-              <a:path extrusionOk="0" h="120000" w="120000">
-                <a:moveTo>
-                  <a:pt x="0" y="0"/>
-                </a:moveTo>
-                <a:lnTo>
-                  <a:pt x="120000" y="0"/>
-                </a:lnTo>
-                <a:lnTo>
-                  <a:pt x="120000" y="120000"/>
-                </a:lnTo>
-                <a:lnTo>
-                  <a:pt x="0" y="120000"/>
-                </a:lnTo>
-                <a:close/>
-              </a:path>
-            </a:pathLst>
-          </a:custGeom>
-          <a:noFill/>
-          <a:ln cap="flat" cmpd="sng" w="9525">
-            <a:solidFill>
-              <a:srgbClr val="000000"/>
-            </a:solidFill>
-            <a:prstDash val="solid"/>
-            <a:round/>
-            <a:headEnd len="sm" w="sm" type="none"/>
-            <a:tailEnd len="sm" w="sm" type="none"/>
-          </a:ln>
-        </p:spPr>
-      </p:sp>
-      <p:sp>
-        <p:nvSpPr>
-          <p:cNvPr id="70" name="Google Shape;70;p3:notes"/>
-          <p:cNvSpPr txBox="1"/>
-          <p:nvPr>
-            <p:ph idx="1" type="body"/>
-          </p:nvPr>
-        </p:nvSpPr>
-        <p:spPr>
-          <a:xfrm>
-            <a:off x="685800" y="4343400"/>
-            <a:ext cx="5486400" cy="4114800"/>
-          </a:xfrm>
-          <a:prstGeom prst="rect">
-            <a:avLst/>
-          </a:prstGeom>
-          <a:noFill/>
-          <a:ln>
-            <a:noFill/>
-          </a:ln>
-        </p:spPr>
-        <p:txBody>
-          <a:bodyPr anchorCtr="0" anchor="t" bIns="91425" lIns="91425" spcFirstLastPara="1" rIns="91425" wrap="square" tIns="91425">
-            <a:noAutofit/>
-          </a:bodyPr>
-          <a:lstStyle/>
-          <a:p>
-            <a:pPr indent="0" lvl="0" marL="0" rtl="0" algn="l">
-              <a:lnSpc>
-                <a:spcPct val="100000"/>
-              </a:lnSpc>
-              <a:spcBef>
-                <a:spcPts val="0"/>
-              </a:spcBef>
-              <a:spcAft>
-                <a:spcPts val="0"/>
-              </a:spcAft>
-              <a:buSzPts val="1100"/>
-              <a:buNone/>
-            </a:pPr>
-            <a:r>
-              <a:rPr lang="pt-BR"/>
-              <a:t>1 - TROCAR SOLICITA TRANCAMENTO DA MATRÍCULA POR SOLICITAÇÃO;</a:t>
-            </a:r>
-            <a:endParaRPr/>
-          </a:p>
-          <a:p>
-            <a:pPr indent="0" lvl="0" marL="0" rtl="0" algn="l">
-              <a:lnSpc>
-                <a:spcPct val="100000"/>
-              </a:lnSpc>
-              <a:spcBef>
-                <a:spcPts val="0"/>
-              </a:spcBef>
-              <a:spcAft>
-                <a:spcPts val="0"/>
-              </a:spcAft>
-              <a:buSzPts val="1100"/>
-              <a:buNone/>
-            </a:pPr>
-            <a:r>
-              <a:rPr lang="pt-BR"/>
-              <a:t>2 - DEVOLVE CONFIRMAÇÃO POR CONFIRMAÇÃO;</a:t>
-            </a:r>
-            <a:endParaRPr/>
-          </a:p>
-          <a:p>
-            <a:pPr indent="0" lvl="0" marL="0" rtl="0" algn="l">
-              <a:lnSpc>
-                <a:spcPct val="100000"/>
-              </a:lnSpc>
-              <a:spcBef>
-                <a:spcPts val="0"/>
-              </a:spcBef>
-              <a:spcAft>
-                <a:spcPts val="0"/>
-              </a:spcAft>
-              <a:buSzPts val="1100"/>
-              <a:buNone/>
-            </a:pPr>
-            <a:r>
-              <a:rPr lang="pt-BR"/>
-              <a:t>3 - TROCAR O FINANCEIRO POR CONTAS A RECEBER;</a:t>
-            </a:r>
-            <a:endParaRPr/>
-          </a:p>
-          <a:p>
-            <a:pPr indent="0" lvl="0" marL="0" rtl="0" algn="l">
-              <a:lnSpc>
-                <a:spcPct val="100000"/>
-              </a:lnSpc>
-              <a:spcBef>
-                <a:spcPts val="0"/>
-              </a:spcBef>
-              <a:spcAft>
-                <a:spcPts val="0"/>
-              </a:spcAft>
-              <a:buSzPts val="1100"/>
-              <a:buNone/>
-            </a:pPr>
-            <a:r>
-              <a:rPr lang="pt-BR"/>
-              <a:t>4 - CRIAR UM FLUXO BIDIRECIONAL ALUNO E TURMA NO DEPÓSITO DE DADOS;</a:t>
-            </a:r>
-            <a:endParaRPr/>
-          </a:p>
-          <a:p>
-            <a:pPr indent="0" lvl="0" marL="0" rtl="0" algn="l">
-              <a:spcBef>
-                <a:spcPts val="0"/>
-              </a:spcBef>
-              <a:spcAft>
-                <a:spcPts val="0"/>
-              </a:spcAft>
-              <a:buClr>
-                <a:schemeClr val="dk1"/>
-              </a:buClr>
-              <a:buSzPts val="1100"/>
-              <a:buFont typeface="Arial"/>
-              <a:buNone/>
-            </a:pPr>
-            <a:r>
-              <a:rPr lang="pt-BR">
-                <a:solidFill>
-                  <a:schemeClr val="dk1"/>
-                </a:solidFill>
-              </a:rPr>
-              <a:t>5 - </a:t>
-            </a:r>
-            <a:r>
-              <a:rPr lang="pt-BR">
-                <a:solidFill>
-                  <a:schemeClr val="dk1"/>
-                </a:solidFill>
-              </a:rPr>
-              <a:t>CRIAR UM DEPÓSITO DE DADOS MATRÍCULA.</a:t>
-            </a:r>
-            <a:endParaRPr/>
-          </a:p>
-        </p:txBody>
-      </p:sp>
-    </p:spTree>
-  </p:cSld>
-  <p:clrMapOvr>
-    <a:masterClrMapping/>
-  </p:clrMapOvr>
-</p:notes>
-</file>
-
-<file path=ppt/notesSlides/notesSlide5.xml><?xml version="1.0" encoding="utf-8"?>
-<p:notes xmlns:a="http://schemas.openxmlformats.org/drawingml/2006/main" xmlns:r="http://schemas.openxmlformats.org/officeDocument/2006/relationships" xmlns:mc="http://schemas.openxmlformats.org/markup-compatibility/2006" xmlns:mv="urn:schemas-microsoft-com:mac:vml" xmlns:p="http://schemas.openxmlformats.org/presentationml/2006/main" xmlns:c="http://schemas.openxmlformats.org/drawingml/2006/chart" xmlns:dgm="http://schemas.openxmlformats.org/drawingml/2006/diagram" xmlns:o="urn:schemas-microsoft-com:office:office" xmlns:v="urn:schemas-microsoft-com:vml" xmlns:pvml="urn:schemas-microsoft-com:office:powerpoint" xmlns:com="http://schemas.openxmlformats.org/drawingml/2006/compatibility" xmlns:p14="http://schemas.microsoft.com/office/powerpoint/2010/main" xmlns:p15="http://schemas.microsoft.com/office/powerpoint/2012/main" xmlns:ahyp="http://schemas.microsoft.com/office/drawing/2018/hyperlinkcolor" showMasterPhAnim="0" showMasterSp="0">
-  <p:cSld>
-    <p:spTree>
-      <p:nvGrpSpPr>
-        <p:cNvPr id="74" name="Shape 74"/>
-        <p:cNvGrpSpPr/>
-        <p:nvPr/>
-      </p:nvGrpSpPr>
-      <p:grpSpPr>
-        <a:xfrm>
-          <a:off x="0" y="0"/>
-          <a:ext cx="0" cy="0"/>
-          <a:chOff x="0" y="0"/>
-          <a:chExt cx="0" cy="0"/>
-        </a:xfrm>
-      </p:grpSpPr>
-      <p:sp>
-        <p:nvSpPr>
-          <p:cNvPr id="75" name="Google Shape;75;p5:notes"/>
-          <p:cNvSpPr/>
-          <p:nvPr>
-            <p:ph idx="2" type="sldImg"/>
-          </p:nvPr>
-        </p:nvSpPr>
-        <p:spPr>
-          <a:xfrm>
-            <a:off x="381300" y="685800"/>
-            <a:ext cx="6096000" cy="3429000"/>
-          </a:xfrm>
-          <a:custGeom>
-            <a:rect b="b" l="l" r="r" t="t"/>
-            <a:pathLst>
-              <a:path extrusionOk="0" h="120000" w="120000">
-                <a:moveTo>
-                  <a:pt x="0" y="0"/>
-                </a:moveTo>
-                <a:lnTo>
-                  <a:pt x="120000" y="0"/>
-                </a:lnTo>
-                <a:lnTo>
-                  <a:pt x="120000" y="120000"/>
-                </a:lnTo>
-                <a:lnTo>
-                  <a:pt x="0" y="120000"/>
-                </a:lnTo>
-                <a:close/>
-              </a:path>
-            </a:pathLst>
-          </a:custGeom>
-          <a:noFill/>
-          <a:ln cap="flat" cmpd="sng" w="9525">
-            <a:solidFill>
-              <a:srgbClr val="000000"/>
-            </a:solidFill>
-            <a:prstDash val="solid"/>
-            <a:round/>
-            <a:headEnd len="sm" w="sm" type="none"/>
-            <a:tailEnd len="sm" w="sm" type="none"/>
-          </a:ln>
-        </p:spPr>
-      </p:sp>
-      <p:sp>
-        <p:nvSpPr>
-          <p:cNvPr id="76" name="Google Shape;76;p5:notes"/>
-          <p:cNvSpPr txBox="1"/>
-          <p:nvPr>
-            <p:ph idx="1" type="body"/>
-          </p:nvPr>
-        </p:nvSpPr>
-        <p:spPr>
-          <a:xfrm>
-            <a:off x="685800" y="4343400"/>
-            <a:ext cx="5486400" cy="4114800"/>
-          </a:xfrm>
-          <a:prstGeom prst="rect">
-            <a:avLst/>
-          </a:prstGeom>
-          <a:noFill/>
-          <a:ln>
-            <a:noFill/>
-          </a:ln>
-        </p:spPr>
-        <p:txBody>
-          <a:bodyPr anchorCtr="0" anchor="t" bIns="91425" lIns="91425" spcFirstLastPara="1" rIns="91425" wrap="square" tIns="91425">
-            <a:noAutofit/>
-          </a:bodyPr>
-          <a:lstStyle/>
-          <a:p>
-            <a:pPr indent="0" lvl="0" marL="0" rtl="0" algn="l">
-              <a:lnSpc>
-                <a:spcPct val="100000"/>
-              </a:lnSpc>
-              <a:spcBef>
-                <a:spcPts val="0"/>
-              </a:spcBef>
-              <a:spcAft>
-                <a:spcPts val="0"/>
-              </a:spcAft>
-              <a:buSzPts val="1100"/>
-              <a:buNone/>
-            </a:pPr>
-            <a:r>
-              <a:rPr lang="pt-BR"/>
-              <a:t>1 - SOLICITA TRANSFERENCIA POR SOLICITAÇÃO</a:t>
-            </a:r>
-            <a:endParaRPr/>
-          </a:p>
-          <a:p>
-            <a:pPr indent="0" lvl="0" marL="0" rtl="0" algn="l">
-              <a:lnSpc>
-                <a:spcPct val="100000"/>
-              </a:lnSpc>
-              <a:spcBef>
-                <a:spcPts val="0"/>
-              </a:spcBef>
-              <a:spcAft>
-                <a:spcPts val="0"/>
-              </a:spcAft>
-              <a:buSzPts val="1100"/>
-              <a:buNone/>
-            </a:pPr>
-            <a:r>
-              <a:rPr lang="pt-BR"/>
-              <a:t>2 - RECUSA  | DATA + TURMA</a:t>
-            </a:r>
-            <a:endParaRPr/>
-          </a:p>
-          <a:p>
-            <a:pPr indent="0" lvl="0" marL="0" rtl="0" algn="l">
-              <a:lnSpc>
-                <a:spcPct val="100000"/>
-              </a:lnSpc>
-              <a:spcBef>
-                <a:spcPts val="0"/>
-              </a:spcBef>
-              <a:spcAft>
-                <a:spcPts val="0"/>
-              </a:spcAft>
-              <a:buSzPts val="1100"/>
-              <a:buNone/>
-            </a:pPr>
-            <a:r>
-              <a:rPr lang="pt-BR"/>
-              <a:t>3 - </a:t>
-            </a:r>
-            <a:r>
-              <a:rPr lang="pt-BR">
-                <a:solidFill>
-                  <a:schemeClr val="dk1"/>
-                </a:solidFill>
-              </a:rPr>
-              <a:t>CRIAR UM DEPÓSITO DE DADOS MATRÍCULA.</a:t>
             </a:r>
             <a:endParaRPr/>
           </a:p>
@@ -1877,7 +957,7 @@
       </p:grpSpPr>
       <p:sp>
         <p:nvSpPr>
-          <p:cNvPr id="10" name="Google Shape;10;p7"/>
+          <p:cNvPr id="10" name="Google Shape;10;p2"/>
           <p:cNvSpPr txBox="1"/>
           <p:nvPr>
             <p:ph type="ctrTitle"/>
@@ -2033,7 +1113,7 @@
       </p:sp>
       <p:sp>
         <p:nvSpPr>
-          <p:cNvPr id="11" name="Google Shape;11;p7"/>
+          <p:cNvPr id="11" name="Google Shape;11;p2"/>
           <p:cNvSpPr txBox="1"/>
           <p:nvPr>
             <p:ph idx="1" type="subTitle"/>
@@ -2189,7 +1269,7 @@
       </p:sp>
       <p:sp>
         <p:nvSpPr>
-          <p:cNvPr id="12" name="Google Shape;12;p7"/>
+          <p:cNvPr id="12" name="Google Shape;12;p2"/>
           <p:cNvSpPr txBox="1"/>
           <p:nvPr>
             <p:ph idx="12" type="sldNum"/>
@@ -2493,7 +1573,7 @@
       </p:grpSpPr>
       <p:sp>
         <p:nvSpPr>
-          <p:cNvPr id="45" name="Google Shape;45;p16"/>
+          <p:cNvPr id="45" name="Google Shape;45;p11"/>
           <p:cNvSpPr txBox="1"/>
           <p:nvPr>
             <p:ph hasCustomPrompt="1" type="title"/>
@@ -2653,7 +1733,7 @@
       </p:sp>
       <p:sp>
         <p:nvSpPr>
-          <p:cNvPr id="46" name="Google Shape;46;p16"/>
+          <p:cNvPr id="46" name="Google Shape;46;p11"/>
           <p:cNvSpPr txBox="1"/>
           <p:nvPr>
             <p:ph idx="1" type="body"/>
@@ -2809,7 +1889,7 @@
       </p:sp>
       <p:sp>
         <p:nvSpPr>
-          <p:cNvPr id="47" name="Google Shape;47;p16"/>
+          <p:cNvPr id="47" name="Google Shape;47;p11"/>
           <p:cNvSpPr txBox="1"/>
           <p:nvPr>
             <p:ph idx="12" type="sldNum"/>
@@ -3113,7 +2193,7 @@
       </p:grpSpPr>
       <p:sp>
         <p:nvSpPr>
-          <p:cNvPr id="49" name="Google Shape;49;p17"/>
+          <p:cNvPr id="49" name="Google Shape;49;p12"/>
           <p:cNvSpPr txBox="1"/>
           <p:nvPr>
             <p:ph idx="12" type="sldNum"/>
@@ -3417,7 +2497,7 @@
       </p:grpSpPr>
       <p:sp>
         <p:nvSpPr>
-          <p:cNvPr id="14" name="Google Shape;14;p8"/>
+          <p:cNvPr id="14" name="Google Shape;14;p3"/>
           <p:cNvSpPr txBox="1"/>
           <p:nvPr>
             <p:ph type="title"/>
@@ -3573,7 +2653,7 @@
       </p:sp>
       <p:sp>
         <p:nvSpPr>
-          <p:cNvPr id="15" name="Google Shape;15;p8"/>
+          <p:cNvPr id="15" name="Google Shape;15;p3"/>
           <p:cNvSpPr txBox="1"/>
           <p:nvPr>
             <p:ph idx="12" type="sldNum"/>
@@ -3877,7 +2957,7 @@
       </p:grpSpPr>
       <p:sp>
         <p:nvSpPr>
-          <p:cNvPr id="17" name="Google Shape;17;p9"/>
+          <p:cNvPr id="17" name="Google Shape;17;p4"/>
           <p:cNvSpPr txBox="1"/>
           <p:nvPr>
             <p:ph type="title"/>
@@ -4033,7 +3113,7 @@
       </p:sp>
       <p:sp>
         <p:nvSpPr>
-          <p:cNvPr id="18" name="Google Shape;18;p9"/>
+          <p:cNvPr id="18" name="Google Shape;18;p4"/>
           <p:cNvSpPr txBox="1"/>
           <p:nvPr>
             <p:ph idx="1" type="body"/>
@@ -4189,7 +3269,7 @@
       </p:sp>
       <p:sp>
         <p:nvSpPr>
-          <p:cNvPr id="19" name="Google Shape;19;p9"/>
+          <p:cNvPr id="19" name="Google Shape;19;p4"/>
           <p:cNvSpPr txBox="1"/>
           <p:nvPr>
             <p:ph idx="12" type="sldNum"/>
@@ -4493,7 +3573,7 @@
       </p:grpSpPr>
       <p:sp>
         <p:nvSpPr>
-          <p:cNvPr id="21" name="Google Shape;21;p10"/>
+          <p:cNvPr id="21" name="Google Shape;21;p5"/>
           <p:cNvSpPr txBox="1"/>
           <p:nvPr>
             <p:ph type="title"/>
@@ -4649,7 +3729,7 @@
       </p:sp>
       <p:sp>
         <p:nvSpPr>
-          <p:cNvPr id="22" name="Google Shape;22;p10"/>
+          <p:cNvPr id="22" name="Google Shape;22;p5"/>
           <p:cNvSpPr txBox="1"/>
           <p:nvPr>
             <p:ph idx="1" type="body"/>
@@ -4805,7 +3885,7 @@
       </p:sp>
       <p:sp>
         <p:nvSpPr>
-          <p:cNvPr id="23" name="Google Shape;23;p10"/>
+          <p:cNvPr id="23" name="Google Shape;23;p5"/>
           <p:cNvSpPr txBox="1"/>
           <p:nvPr>
             <p:ph idx="2" type="body"/>
@@ -4961,7 +4041,7 @@
       </p:sp>
       <p:sp>
         <p:nvSpPr>
-          <p:cNvPr id="24" name="Google Shape;24;p10"/>
+          <p:cNvPr id="24" name="Google Shape;24;p5"/>
           <p:cNvSpPr txBox="1"/>
           <p:nvPr>
             <p:ph idx="12" type="sldNum"/>
@@ -5265,7 +4345,7 @@
       </p:grpSpPr>
       <p:sp>
         <p:nvSpPr>
-          <p:cNvPr id="26" name="Google Shape;26;p11"/>
+          <p:cNvPr id="26" name="Google Shape;26;p6"/>
           <p:cNvSpPr txBox="1"/>
           <p:nvPr>
             <p:ph type="title"/>
@@ -5421,7 +4501,7 @@
       </p:sp>
       <p:sp>
         <p:nvSpPr>
-          <p:cNvPr id="27" name="Google Shape;27;p11"/>
+          <p:cNvPr id="27" name="Google Shape;27;p6"/>
           <p:cNvSpPr txBox="1"/>
           <p:nvPr>
             <p:ph idx="12" type="sldNum"/>
@@ -5725,7 +4805,7 @@
       </p:grpSpPr>
       <p:sp>
         <p:nvSpPr>
-          <p:cNvPr id="29" name="Google Shape;29;p12"/>
+          <p:cNvPr id="29" name="Google Shape;29;p7"/>
           <p:cNvSpPr txBox="1"/>
           <p:nvPr>
             <p:ph type="title"/>
@@ -5881,7 +4961,7 @@
       </p:sp>
       <p:sp>
         <p:nvSpPr>
-          <p:cNvPr id="30" name="Google Shape;30;p12"/>
+          <p:cNvPr id="30" name="Google Shape;30;p7"/>
           <p:cNvSpPr txBox="1"/>
           <p:nvPr>
             <p:ph idx="1" type="body"/>
@@ -6037,7 +5117,7 @@
       </p:sp>
       <p:sp>
         <p:nvSpPr>
-          <p:cNvPr id="31" name="Google Shape;31;p12"/>
+          <p:cNvPr id="31" name="Google Shape;31;p7"/>
           <p:cNvSpPr txBox="1"/>
           <p:nvPr>
             <p:ph idx="12" type="sldNum"/>
@@ -6341,7 +5421,7 @@
       </p:grpSpPr>
       <p:sp>
         <p:nvSpPr>
-          <p:cNvPr id="33" name="Google Shape;33;p13"/>
+          <p:cNvPr id="33" name="Google Shape;33;p8"/>
           <p:cNvSpPr txBox="1"/>
           <p:nvPr>
             <p:ph type="title"/>
@@ -6497,7 +5577,7 @@
       </p:sp>
       <p:sp>
         <p:nvSpPr>
-          <p:cNvPr id="34" name="Google Shape;34;p13"/>
+          <p:cNvPr id="34" name="Google Shape;34;p8"/>
           <p:cNvSpPr txBox="1"/>
           <p:nvPr>
             <p:ph idx="12" type="sldNum"/>
@@ -6801,7 +5881,7 @@
       </p:grpSpPr>
       <p:sp>
         <p:nvSpPr>
-          <p:cNvPr id="36" name="Google Shape;36;p14"/>
+          <p:cNvPr id="36" name="Google Shape;36;p9"/>
           <p:cNvSpPr/>
           <p:nvPr/>
         </p:nvSpPr>
@@ -6860,7 +5940,7 @@
       </p:sp>
       <p:sp>
         <p:nvSpPr>
-          <p:cNvPr id="37" name="Google Shape;37;p14"/>
+          <p:cNvPr id="37" name="Google Shape;37;p9"/>
           <p:cNvSpPr txBox="1"/>
           <p:nvPr>
             <p:ph type="title"/>
@@ -7016,7 +6096,7 @@
       </p:sp>
       <p:sp>
         <p:nvSpPr>
-          <p:cNvPr id="38" name="Google Shape;38;p14"/>
+          <p:cNvPr id="38" name="Google Shape;38;p9"/>
           <p:cNvSpPr txBox="1"/>
           <p:nvPr>
             <p:ph idx="1" type="subTitle"/>
@@ -7172,7 +6252,7 @@
       </p:sp>
       <p:sp>
         <p:nvSpPr>
-          <p:cNvPr id="39" name="Google Shape;39;p14"/>
+          <p:cNvPr id="39" name="Google Shape;39;p9"/>
           <p:cNvSpPr txBox="1"/>
           <p:nvPr>
             <p:ph idx="2" type="body"/>
@@ -7328,7 +6408,7 @@
       </p:sp>
       <p:sp>
         <p:nvSpPr>
-          <p:cNvPr id="40" name="Google Shape;40;p14"/>
+          <p:cNvPr id="40" name="Google Shape;40;p9"/>
           <p:cNvSpPr txBox="1"/>
           <p:nvPr>
             <p:ph idx="12" type="sldNum"/>
@@ -7632,7 +6712,7 @@
       </p:grpSpPr>
       <p:sp>
         <p:nvSpPr>
-          <p:cNvPr id="42" name="Google Shape;42;p15"/>
+          <p:cNvPr id="42" name="Google Shape;42;p10"/>
           <p:cNvSpPr txBox="1"/>
           <p:nvPr>
             <p:ph idx="1" type="body"/>
@@ -7676,7 +6756,7 @@
       </p:sp>
       <p:sp>
         <p:nvSpPr>
-          <p:cNvPr id="43" name="Google Shape;43;p15"/>
+          <p:cNvPr id="43" name="Google Shape;43;p10"/>
           <p:cNvSpPr txBox="1"/>
           <p:nvPr>
             <p:ph idx="12" type="sldNum"/>
@@ -7987,7 +7067,7 @@
       </p:grpSpPr>
       <p:sp>
         <p:nvSpPr>
-          <p:cNvPr id="6" name="Google Shape;6;p6"/>
+          <p:cNvPr id="6" name="Google Shape;6;p1"/>
           <p:cNvSpPr txBox="1"/>
           <p:nvPr>
             <p:ph type="title"/>
@@ -8251,7 +7331,7 @@
       </p:sp>
       <p:sp>
         <p:nvSpPr>
-          <p:cNvPr id="7" name="Google Shape;7;p6"/>
+          <p:cNvPr id="7" name="Google Shape;7;p1"/>
           <p:cNvSpPr txBox="1"/>
           <p:nvPr>
             <p:ph idx="1" type="body"/>
@@ -8515,7 +7595,7 @@
       </p:sp>
       <p:sp>
         <p:nvSpPr>
-          <p:cNvPr id="8" name="Google Shape;8;p6"/>
+          <p:cNvPr id="8" name="Google Shape;8;p1"/>
           <p:cNvSpPr txBox="1"/>
           <p:nvPr>
             <p:ph idx="12" type="sldNum"/>
@@ -8796,17 +7876,17 @@
   </p:cSld>
   <p:clrMap accent1="accent1" accent2="accent2" accent3="accent3" accent4="accent4" accent5="accent5" accent6="accent6" bg1="lt1" bg2="dk2" tx1="dk1" tx2="lt2" folHlink="folHlink" hlink="hlink"/>
   <p:sldLayoutIdLst>
-    <p:sldLayoutId id="2147483649" r:id="rId1"/>
-    <p:sldLayoutId id="2147483650" r:id="rId2"/>
-    <p:sldLayoutId id="2147483651" r:id="rId3"/>
-    <p:sldLayoutId id="2147483652" r:id="rId4"/>
-    <p:sldLayoutId id="2147483653" r:id="rId5"/>
-    <p:sldLayoutId id="2147483654" r:id="rId6"/>
-    <p:sldLayoutId id="2147483655" r:id="rId7"/>
-    <p:sldLayoutId id="2147483656" r:id="rId8"/>
-    <p:sldLayoutId id="2147483657" r:id="rId9"/>
-    <p:sldLayoutId id="2147483658" r:id="rId10"/>
-    <p:sldLayoutId id="2147483659" r:id="rId11"/>
+    <p:sldLayoutId id="2147483648" r:id="rId1"/>
+    <p:sldLayoutId id="2147483649" r:id="rId2"/>
+    <p:sldLayoutId id="2147483650" r:id="rId3"/>
+    <p:sldLayoutId id="2147483651" r:id="rId4"/>
+    <p:sldLayoutId id="2147483652" r:id="rId5"/>
+    <p:sldLayoutId id="2147483653" r:id="rId6"/>
+    <p:sldLayoutId id="2147483654" r:id="rId7"/>
+    <p:sldLayoutId id="2147483655" r:id="rId8"/>
+    <p:sldLayoutId id="2147483656" r:id="rId9"/>
+    <p:sldLayoutId id="2147483657" r:id="rId10"/>
+    <p:sldLayoutId id="2147483658" r:id="rId11"/>
   </p:sldLayoutIdLst>
   <p:hf dt="0" ftr="0" hdr="0" sldNum="0"/>
   <p:txStyles>
@@ -9520,14 +8600,14 @@
       </p:grpSpPr>
       <p:sp>
         <p:nvSpPr>
-          <p:cNvPr id="54" name="Google Shape;54;p1"/>
+          <p:cNvPr id="54" name="Google Shape;54;p13"/>
           <p:cNvSpPr txBox="1"/>
           <p:nvPr/>
         </p:nvSpPr>
         <p:spPr>
           <a:xfrm>
-            <a:off x="1861050" y="0"/>
-            <a:ext cx="5421900" cy="644100"/>
+            <a:off x="1861050" y="76200"/>
+            <a:ext cx="5421900" cy="765000"/>
           </a:xfrm>
           <a:prstGeom prst="rect">
             <a:avLst/>
@@ -9561,25 +8641,25 @@
               <a:buNone/>
             </a:pPr>
             <a:r>
-              <a:rPr b="0" i="0" lang="pt-BR" sz="1400" u="none" cap="none" strike="noStrike">
+              <a:rPr i="0" lang="pt-BR" sz="2000" u="none" cap="none" strike="noStrike">
                 <a:solidFill>
                   <a:srgbClr val="000000"/>
                 </a:solidFill>
-                <a:latin typeface="Arial"/>
-                <a:ea typeface="Arial"/>
-                <a:cs typeface="Arial"/>
-                <a:sym typeface="Arial"/>
+                <a:latin typeface="Georgia"/>
+                <a:ea typeface="Georgia"/>
+                <a:cs typeface="Georgia"/>
+                <a:sym typeface="Georgia"/>
               </a:rPr>
               <a:t>DFD ESSENCIAL</a:t>
             </a:r>
-            <a:endParaRPr b="0" i="0" sz="1400" u="none" cap="none" strike="noStrike">
+            <a:endParaRPr i="0" sz="2000" u="none" cap="none" strike="noStrike">
               <a:solidFill>
                 <a:srgbClr val="000000"/>
               </a:solidFill>
-              <a:latin typeface="Arial"/>
-              <a:ea typeface="Arial"/>
-              <a:cs typeface="Arial"/>
-              <a:sym typeface="Arial"/>
+              <a:latin typeface="Georgia"/>
+              <a:ea typeface="Georgia"/>
+              <a:cs typeface="Georgia"/>
+              <a:sym typeface="Georgia"/>
             </a:endParaRPr>
           </a:p>
           <a:p>
@@ -9601,32 +8681,41 @@
               <a:buNone/>
             </a:pPr>
             <a:r>
-              <a:rPr b="0" i="0" lang="pt-BR" sz="1400" u="none" cap="none" strike="noStrike">
+              <a:rPr lang="pt-BR" sz="2000">
+                <a:latin typeface="Georgia"/>
+                <a:ea typeface="Georgia"/>
+                <a:cs typeface="Georgia"/>
+                <a:sym typeface="Georgia"/>
+              </a:rPr>
+              <a:t>de </a:t>
+            </a:r>
+            <a:r>
+              <a:rPr i="0" lang="pt-BR" sz="2000" u="none" cap="none" strike="noStrike">
                 <a:solidFill>
                   <a:srgbClr val="000000"/>
                 </a:solidFill>
-                <a:latin typeface="Arial"/>
-                <a:ea typeface="Arial"/>
-                <a:cs typeface="Arial"/>
-                <a:sym typeface="Arial"/>
+                <a:latin typeface="Georgia"/>
+                <a:ea typeface="Georgia"/>
+                <a:cs typeface="Georgia"/>
+                <a:sym typeface="Georgia"/>
               </a:rPr>
               <a:t>REALIZAÇÃO DA MATRÍCULA</a:t>
             </a:r>
-            <a:endParaRPr b="0" i="0" sz="1400" u="none" cap="none" strike="noStrike">
+            <a:endParaRPr i="0" sz="2000" u="none" cap="none" strike="noStrike">
               <a:solidFill>
                 <a:srgbClr val="000000"/>
               </a:solidFill>
-              <a:latin typeface="Arial"/>
-              <a:ea typeface="Arial"/>
-              <a:cs typeface="Arial"/>
-              <a:sym typeface="Arial"/>
+              <a:latin typeface="Georgia"/>
+              <a:ea typeface="Georgia"/>
+              <a:cs typeface="Georgia"/>
+              <a:sym typeface="Georgia"/>
             </a:endParaRPr>
           </a:p>
         </p:txBody>
       </p:sp>
       <p:pic>
         <p:nvPicPr>
-          <p:cNvPr id="55" name="Google Shape;55;p1"/>
+          <p:cNvPr id="55" name="Google Shape;55;p13"/>
           <p:cNvPicPr preferRelativeResize="0"/>
           <p:nvPr/>
         </p:nvPicPr>
@@ -9640,644 +8729,8 @@
         </p:blipFill>
         <p:spPr>
           <a:xfrm>
-            <a:off x="1990900" y="550400"/>
-            <a:ext cx="5162199" cy="4495100"/>
-          </a:xfrm>
-          <a:prstGeom prst="rect">
-            <a:avLst/>
-          </a:prstGeom>
-          <a:noFill/>
-          <a:ln>
-            <a:noFill/>
-          </a:ln>
-        </p:spPr>
-      </p:pic>
-    </p:spTree>
-  </p:cSld>
-  <p:clrMapOvr>
-    <a:masterClrMapping/>
-  </p:clrMapOvr>
-</p:sld>
-</file>
-
-<file path=ppt/slides/slide2.xml><?xml version="1.0" encoding="utf-8"?>
-<p:sld xmlns:a="http://schemas.openxmlformats.org/drawingml/2006/main" xmlns:r="http://schemas.openxmlformats.org/officeDocument/2006/relationships" xmlns:mc="http://schemas.openxmlformats.org/markup-compatibility/2006" xmlns:mv="urn:schemas-microsoft-com:mac:vml" xmlns:p="http://schemas.openxmlformats.org/presentationml/2006/main" xmlns:c="http://schemas.openxmlformats.org/drawingml/2006/chart" xmlns:dgm="http://schemas.openxmlformats.org/drawingml/2006/diagram" xmlns:o="urn:schemas-microsoft-com:office:office" xmlns:v="urn:schemas-microsoft-com:vml" xmlns:pvml="urn:schemas-microsoft-com:office:powerpoint" xmlns:com="http://schemas.openxmlformats.org/drawingml/2006/compatibility" xmlns:p14="http://schemas.microsoft.com/office/powerpoint/2010/main" xmlns:p15="http://schemas.microsoft.com/office/powerpoint/2012/main" xmlns:ahyp="http://schemas.microsoft.com/office/drawing/2018/hyperlinkcolor">
-  <p:cSld>
-    <p:spTree>
-      <p:nvGrpSpPr>
-        <p:cNvPr id="59" name="Shape 59"/>
-        <p:cNvGrpSpPr/>
-        <p:nvPr/>
-      </p:nvGrpSpPr>
-      <p:grpSpPr>
-        <a:xfrm>
-          <a:off x="0" y="0"/>
-          <a:ext cx="0" cy="0"/>
-          <a:chOff x="0" y="0"/>
-          <a:chExt cx="0" cy="0"/>
-        </a:xfrm>
-      </p:grpSpPr>
-      <p:sp>
-        <p:nvSpPr>
-          <p:cNvPr id="60" name="Google Shape;60;p4"/>
-          <p:cNvSpPr txBox="1"/>
-          <p:nvPr/>
-        </p:nvSpPr>
-        <p:spPr>
-          <a:xfrm>
-            <a:off x="1861050" y="103025"/>
-            <a:ext cx="5421900" cy="644100"/>
-          </a:xfrm>
-          <a:prstGeom prst="rect">
-            <a:avLst/>
-          </a:prstGeom>
-          <a:noFill/>
-          <a:ln>
-            <a:noFill/>
-          </a:ln>
-        </p:spPr>
-        <p:txBody>
-          <a:bodyPr anchorCtr="0" anchor="t" bIns="91425" lIns="91425" spcFirstLastPara="1" rIns="91425" wrap="square" tIns="91425">
-            <a:noAutofit/>
-          </a:bodyPr>
-          <a:lstStyle/>
-          <a:p>
-            <a:pPr indent="0" lvl="0" marL="0" marR="0" rtl="0" algn="ctr">
-              <a:lnSpc>
-                <a:spcPct val="100000"/>
-              </a:lnSpc>
-              <a:spcBef>
-                <a:spcPts val="0"/>
-              </a:spcBef>
-              <a:spcAft>
-                <a:spcPts val="0"/>
-              </a:spcAft>
-              <a:buClr>
-                <a:srgbClr val="000000"/>
-              </a:buClr>
-              <a:buSzPts val="1400"/>
-              <a:buFont typeface="Arial"/>
-              <a:buNone/>
-            </a:pPr>
-            <a:r>
-              <a:rPr b="0" i="0" lang="pt-BR" sz="1400" u="none" cap="none" strike="noStrike">
-                <a:solidFill>
-                  <a:srgbClr val="000000"/>
-                </a:solidFill>
-                <a:latin typeface="Arial"/>
-                <a:ea typeface="Arial"/>
-                <a:cs typeface="Arial"/>
-                <a:sym typeface="Arial"/>
-              </a:rPr>
-              <a:t>DFD ESSENCIAL</a:t>
-            </a:r>
-            <a:endParaRPr b="0" i="0" sz="1400" u="none" cap="none" strike="noStrike">
-              <a:solidFill>
-                <a:srgbClr val="000000"/>
-              </a:solidFill>
-              <a:latin typeface="Arial"/>
-              <a:ea typeface="Arial"/>
-              <a:cs typeface="Arial"/>
-              <a:sym typeface="Arial"/>
-            </a:endParaRPr>
-          </a:p>
-          <a:p>
-            <a:pPr indent="0" lvl="0" marL="0" marR="0" rtl="0" algn="ctr">
-              <a:lnSpc>
-                <a:spcPct val="100000"/>
-              </a:lnSpc>
-              <a:spcBef>
-                <a:spcPts val="0"/>
-              </a:spcBef>
-              <a:spcAft>
-                <a:spcPts val="0"/>
-              </a:spcAft>
-              <a:buClr>
-                <a:srgbClr val="000000"/>
-              </a:buClr>
-              <a:buSzPts val="1400"/>
-              <a:buFont typeface="Arial"/>
-              <a:buNone/>
-            </a:pPr>
-            <a:r>
-              <a:rPr b="0" i="0" lang="pt-BR" sz="1400" u="none" cap="none" strike="noStrike">
-                <a:solidFill>
-                  <a:srgbClr val="000000"/>
-                </a:solidFill>
-                <a:latin typeface="Arial"/>
-                <a:ea typeface="Arial"/>
-                <a:cs typeface="Arial"/>
-                <a:sym typeface="Arial"/>
-              </a:rPr>
-              <a:t>REABRIR MATRÍCULA</a:t>
-            </a:r>
-            <a:endParaRPr b="0" i="0" sz="1400" u="none" cap="none" strike="noStrike">
-              <a:solidFill>
-                <a:srgbClr val="000000"/>
-              </a:solidFill>
-              <a:latin typeface="Arial"/>
-              <a:ea typeface="Arial"/>
-              <a:cs typeface="Arial"/>
-              <a:sym typeface="Arial"/>
-            </a:endParaRPr>
-          </a:p>
-        </p:txBody>
-      </p:sp>
-      <p:pic>
-        <p:nvPicPr>
-          <p:cNvPr id="61" name="Google Shape;61;p4"/>
-          <p:cNvPicPr preferRelativeResize="0"/>
-          <p:nvPr/>
-        </p:nvPicPr>
-        <p:blipFill>
-          <a:blip r:embed="rId3">
-            <a:alphaModFix/>
-          </a:blip>
-          <a:stretch>
-            <a:fillRect/>
-          </a:stretch>
-        </p:blipFill>
-        <p:spPr>
-          <a:xfrm>
-            <a:off x="152400" y="1059062"/>
-            <a:ext cx="8839200" cy="3025376"/>
-          </a:xfrm>
-          <a:prstGeom prst="rect">
-            <a:avLst/>
-          </a:prstGeom>
-          <a:noFill/>
-          <a:ln>
-            <a:noFill/>
-          </a:ln>
-        </p:spPr>
-      </p:pic>
-    </p:spTree>
-  </p:cSld>
-  <p:clrMapOvr>
-    <a:masterClrMapping/>
-  </p:clrMapOvr>
-</p:sld>
-</file>
-
-<file path=ppt/slides/slide3.xml><?xml version="1.0" encoding="utf-8"?>
-<p:sld xmlns:a="http://schemas.openxmlformats.org/drawingml/2006/main" xmlns:r="http://schemas.openxmlformats.org/officeDocument/2006/relationships" xmlns:mc="http://schemas.openxmlformats.org/markup-compatibility/2006" xmlns:mv="urn:schemas-microsoft-com:mac:vml" xmlns:p="http://schemas.openxmlformats.org/presentationml/2006/main" xmlns:c="http://schemas.openxmlformats.org/drawingml/2006/chart" xmlns:dgm="http://schemas.openxmlformats.org/drawingml/2006/diagram" xmlns:o="urn:schemas-microsoft-com:office:office" xmlns:v="urn:schemas-microsoft-com:vml" xmlns:pvml="urn:schemas-microsoft-com:office:powerpoint" xmlns:com="http://schemas.openxmlformats.org/drawingml/2006/compatibility" xmlns:p14="http://schemas.microsoft.com/office/powerpoint/2010/main" xmlns:p15="http://schemas.microsoft.com/office/powerpoint/2012/main" xmlns:ahyp="http://schemas.microsoft.com/office/drawing/2018/hyperlinkcolor">
-  <p:cSld>
-    <p:spTree>
-      <p:nvGrpSpPr>
-        <p:cNvPr id="65" name="Shape 65"/>
-        <p:cNvGrpSpPr/>
-        <p:nvPr/>
-      </p:nvGrpSpPr>
-      <p:grpSpPr>
-        <a:xfrm>
-          <a:off x="0" y="0"/>
-          <a:ext cx="0" cy="0"/>
-          <a:chOff x="0" y="0"/>
-          <a:chExt cx="0" cy="0"/>
-        </a:xfrm>
-      </p:grpSpPr>
-      <p:sp>
-        <p:nvSpPr>
-          <p:cNvPr id="66" name="Google Shape;66;p2"/>
-          <p:cNvSpPr txBox="1"/>
-          <p:nvPr/>
-        </p:nvSpPr>
-        <p:spPr>
-          <a:xfrm>
-            <a:off x="1861050" y="103025"/>
-            <a:ext cx="5421900" cy="644100"/>
-          </a:xfrm>
-          <a:prstGeom prst="rect">
-            <a:avLst/>
-          </a:prstGeom>
-          <a:noFill/>
-          <a:ln>
-            <a:noFill/>
-          </a:ln>
-        </p:spPr>
-        <p:txBody>
-          <a:bodyPr anchorCtr="0" anchor="t" bIns="91425" lIns="91425" spcFirstLastPara="1" rIns="91425" wrap="square" tIns="91425">
-            <a:noAutofit/>
-          </a:bodyPr>
-          <a:lstStyle/>
-          <a:p>
-            <a:pPr indent="0" lvl="0" marL="0" marR="0" rtl="0" algn="ctr">
-              <a:lnSpc>
-                <a:spcPct val="100000"/>
-              </a:lnSpc>
-              <a:spcBef>
-                <a:spcPts val="0"/>
-              </a:spcBef>
-              <a:spcAft>
-                <a:spcPts val="0"/>
-              </a:spcAft>
-              <a:buClr>
-                <a:srgbClr val="000000"/>
-              </a:buClr>
-              <a:buSzPts val="1400"/>
-              <a:buFont typeface="Arial"/>
-              <a:buNone/>
-            </a:pPr>
-            <a:r>
-              <a:rPr b="0" i="0" lang="pt-BR" sz="1400" u="none" cap="none" strike="noStrike">
-                <a:solidFill>
-                  <a:srgbClr val="000000"/>
-                </a:solidFill>
-                <a:latin typeface="Arial"/>
-                <a:ea typeface="Arial"/>
-                <a:cs typeface="Arial"/>
-                <a:sym typeface="Arial"/>
-              </a:rPr>
-              <a:t>DFD ESSENCIAL</a:t>
-            </a:r>
-            <a:endParaRPr b="0" i="0" sz="1400" u="none" cap="none" strike="noStrike">
-              <a:solidFill>
-                <a:srgbClr val="000000"/>
-              </a:solidFill>
-              <a:latin typeface="Arial"/>
-              <a:ea typeface="Arial"/>
-              <a:cs typeface="Arial"/>
-              <a:sym typeface="Arial"/>
-            </a:endParaRPr>
-          </a:p>
-          <a:p>
-            <a:pPr indent="0" lvl="0" marL="0" marR="0" rtl="0" algn="ctr">
-              <a:lnSpc>
-                <a:spcPct val="100000"/>
-              </a:lnSpc>
-              <a:spcBef>
-                <a:spcPts val="0"/>
-              </a:spcBef>
-              <a:spcAft>
-                <a:spcPts val="0"/>
-              </a:spcAft>
-              <a:buClr>
-                <a:srgbClr val="000000"/>
-              </a:buClr>
-              <a:buSzPts val="1400"/>
-              <a:buFont typeface="Arial"/>
-              <a:buNone/>
-            </a:pPr>
-            <a:r>
-              <a:rPr b="0" i="0" lang="pt-BR" sz="1400" u="none" cap="none" strike="noStrike">
-                <a:solidFill>
-                  <a:srgbClr val="000000"/>
-                </a:solidFill>
-                <a:latin typeface="Arial"/>
-                <a:ea typeface="Arial"/>
-                <a:cs typeface="Arial"/>
-                <a:sym typeface="Arial"/>
-              </a:rPr>
-              <a:t>MINISTRAR AULAS</a:t>
-            </a:r>
-            <a:endParaRPr b="0" i="0" sz="1400" u="none" cap="none" strike="noStrike">
-              <a:solidFill>
-                <a:srgbClr val="000000"/>
-              </a:solidFill>
-              <a:latin typeface="Arial"/>
-              <a:ea typeface="Arial"/>
-              <a:cs typeface="Arial"/>
-              <a:sym typeface="Arial"/>
-            </a:endParaRPr>
-          </a:p>
-        </p:txBody>
-      </p:sp>
-      <p:pic>
-        <p:nvPicPr>
-          <p:cNvPr id="67" name="Google Shape;67;p2"/>
-          <p:cNvPicPr preferRelativeResize="0"/>
-          <p:nvPr/>
-        </p:nvPicPr>
-        <p:blipFill>
-          <a:blip r:embed="rId3">
-            <a:alphaModFix/>
-          </a:blip>
-          <a:stretch>
-            <a:fillRect/>
-          </a:stretch>
-        </p:blipFill>
-        <p:spPr>
-          <a:xfrm>
-            <a:off x="1738313" y="838200"/>
-            <a:ext cx="5667375" cy="3467100"/>
-          </a:xfrm>
-          <a:prstGeom prst="rect">
-            <a:avLst/>
-          </a:prstGeom>
-          <a:noFill/>
-          <a:ln>
-            <a:noFill/>
-          </a:ln>
-        </p:spPr>
-      </p:pic>
-    </p:spTree>
-  </p:cSld>
-  <p:clrMapOvr>
-    <a:masterClrMapping/>
-  </p:clrMapOvr>
-</p:sld>
-</file>
-
-<file path=ppt/slides/slide4.xml><?xml version="1.0" encoding="utf-8"?>
-<p:sld xmlns:a="http://schemas.openxmlformats.org/drawingml/2006/main" xmlns:r="http://schemas.openxmlformats.org/officeDocument/2006/relationships" xmlns:mc="http://schemas.openxmlformats.org/markup-compatibility/2006" xmlns:mv="urn:schemas-microsoft-com:mac:vml" xmlns:p="http://schemas.openxmlformats.org/presentationml/2006/main" xmlns:c="http://schemas.openxmlformats.org/drawingml/2006/chart" xmlns:dgm="http://schemas.openxmlformats.org/drawingml/2006/diagram" xmlns:o="urn:schemas-microsoft-com:office:office" xmlns:v="urn:schemas-microsoft-com:vml" xmlns:pvml="urn:schemas-microsoft-com:office:powerpoint" xmlns:com="http://schemas.openxmlformats.org/drawingml/2006/compatibility" xmlns:p14="http://schemas.microsoft.com/office/powerpoint/2010/main" xmlns:p15="http://schemas.microsoft.com/office/powerpoint/2012/main" xmlns:ahyp="http://schemas.microsoft.com/office/drawing/2018/hyperlinkcolor">
-  <p:cSld>
-    <p:spTree>
-      <p:nvGrpSpPr>
-        <p:cNvPr id="71" name="Shape 71"/>
-        <p:cNvGrpSpPr/>
-        <p:nvPr/>
-      </p:nvGrpSpPr>
-      <p:grpSpPr>
-        <a:xfrm>
-          <a:off x="0" y="0"/>
-          <a:ext cx="0" cy="0"/>
-          <a:chOff x="0" y="0"/>
-          <a:chExt cx="0" cy="0"/>
-        </a:xfrm>
-      </p:grpSpPr>
-      <p:sp>
-        <p:nvSpPr>
-          <p:cNvPr id="72" name="Google Shape;72;p3"/>
-          <p:cNvSpPr txBox="1"/>
-          <p:nvPr/>
-        </p:nvSpPr>
-        <p:spPr>
-          <a:xfrm>
-            <a:off x="1861050" y="103025"/>
-            <a:ext cx="5421900" cy="644100"/>
-          </a:xfrm>
-          <a:prstGeom prst="rect">
-            <a:avLst/>
-          </a:prstGeom>
-          <a:noFill/>
-          <a:ln>
-            <a:noFill/>
-          </a:ln>
-        </p:spPr>
-        <p:txBody>
-          <a:bodyPr anchorCtr="0" anchor="t" bIns="91425" lIns="91425" spcFirstLastPara="1" rIns="91425" wrap="square" tIns="91425">
-            <a:noAutofit/>
-          </a:bodyPr>
-          <a:lstStyle/>
-          <a:p>
-            <a:pPr indent="0" lvl="0" marL="0" marR="0" rtl="0" algn="ctr">
-              <a:lnSpc>
-                <a:spcPct val="100000"/>
-              </a:lnSpc>
-              <a:spcBef>
-                <a:spcPts val="0"/>
-              </a:spcBef>
-              <a:spcAft>
-                <a:spcPts val="0"/>
-              </a:spcAft>
-              <a:buClr>
-                <a:srgbClr val="000000"/>
-              </a:buClr>
-              <a:buSzPts val="1400"/>
-              <a:buFont typeface="Arial"/>
-              <a:buNone/>
-            </a:pPr>
-            <a:r>
-              <a:rPr b="0" i="0" lang="pt-BR" sz="1400" u="none" cap="none" strike="noStrike">
-                <a:solidFill>
-                  <a:srgbClr val="000000"/>
-                </a:solidFill>
-                <a:latin typeface="Arial"/>
-                <a:ea typeface="Arial"/>
-                <a:cs typeface="Arial"/>
-                <a:sym typeface="Arial"/>
-              </a:rPr>
-              <a:t>DFD ESSENCIAL</a:t>
-            </a:r>
-            <a:endParaRPr b="0" i="0" sz="1400" u="none" cap="none" strike="noStrike">
-              <a:solidFill>
-                <a:srgbClr val="000000"/>
-              </a:solidFill>
-              <a:latin typeface="Arial"/>
-              <a:ea typeface="Arial"/>
-              <a:cs typeface="Arial"/>
-              <a:sym typeface="Arial"/>
-            </a:endParaRPr>
-          </a:p>
-          <a:p>
-            <a:pPr indent="0" lvl="0" marL="0" marR="0" rtl="0" algn="ctr">
-              <a:lnSpc>
-                <a:spcPct val="100000"/>
-              </a:lnSpc>
-              <a:spcBef>
-                <a:spcPts val="0"/>
-              </a:spcBef>
-              <a:spcAft>
-                <a:spcPts val="0"/>
-              </a:spcAft>
-              <a:buClr>
-                <a:srgbClr val="000000"/>
-              </a:buClr>
-              <a:buSzPts val="1400"/>
-              <a:buFont typeface="Arial"/>
-              <a:buNone/>
-            </a:pPr>
-            <a:r>
-              <a:rPr b="0" i="0" lang="pt-BR" sz="1400" u="none" cap="none" strike="noStrike">
-                <a:solidFill>
-                  <a:srgbClr val="000000"/>
-                </a:solidFill>
-                <a:latin typeface="Arial"/>
-                <a:ea typeface="Arial"/>
-                <a:cs typeface="Arial"/>
-                <a:sym typeface="Arial"/>
-              </a:rPr>
-              <a:t>TRANCAR MATRÍCULA</a:t>
-            </a:r>
-            <a:endParaRPr b="0" i="0" sz="1400" u="none" cap="none" strike="noStrike">
-              <a:solidFill>
-                <a:srgbClr val="000000"/>
-              </a:solidFill>
-              <a:latin typeface="Arial"/>
-              <a:ea typeface="Arial"/>
-              <a:cs typeface="Arial"/>
-              <a:sym typeface="Arial"/>
-            </a:endParaRPr>
-          </a:p>
-        </p:txBody>
-      </p:sp>
-      <p:pic>
-        <p:nvPicPr>
-          <p:cNvPr id="73" name="Google Shape;73;p3"/>
-          <p:cNvPicPr preferRelativeResize="0"/>
-          <p:nvPr/>
-        </p:nvPicPr>
-        <p:blipFill>
-          <a:blip r:embed="rId3">
-            <a:alphaModFix/>
-          </a:blip>
-          <a:stretch>
-            <a:fillRect/>
-          </a:stretch>
-        </p:blipFill>
-        <p:spPr>
-          <a:xfrm>
-            <a:off x="2038350" y="995363"/>
-            <a:ext cx="5067300" cy="3152775"/>
-          </a:xfrm>
-          <a:prstGeom prst="rect">
-            <a:avLst/>
-          </a:prstGeom>
-          <a:noFill/>
-          <a:ln>
-            <a:noFill/>
-          </a:ln>
-        </p:spPr>
-      </p:pic>
-    </p:spTree>
-  </p:cSld>
-  <p:clrMapOvr>
-    <a:masterClrMapping/>
-  </p:clrMapOvr>
-</p:sld>
-</file>
-
-<file path=ppt/slides/slide5.xml><?xml version="1.0" encoding="utf-8"?>
-<p:sld xmlns:a="http://schemas.openxmlformats.org/drawingml/2006/main" xmlns:r="http://schemas.openxmlformats.org/officeDocument/2006/relationships" xmlns:mc="http://schemas.openxmlformats.org/markup-compatibility/2006" xmlns:mv="urn:schemas-microsoft-com:mac:vml" xmlns:p="http://schemas.openxmlformats.org/presentationml/2006/main" xmlns:c="http://schemas.openxmlformats.org/drawingml/2006/chart" xmlns:dgm="http://schemas.openxmlformats.org/drawingml/2006/diagram" xmlns:o="urn:schemas-microsoft-com:office:office" xmlns:v="urn:schemas-microsoft-com:vml" xmlns:pvml="urn:schemas-microsoft-com:office:powerpoint" xmlns:com="http://schemas.openxmlformats.org/drawingml/2006/compatibility" xmlns:p14="http://schemas.microsoft.com/office/powerpoint/2010/main" xmlns:p15="http://schemas.microsoft.com/office/powerpoint/2012/main" xmlns:ahyp="http://schemas.microsoft.com/office/drawing/2018/hyperlinkcolor">
-  <p:cSld>
-    <p:spTree>
-      <p:nvGrpSpPr>
-        <p:cNvPr id="77" name="Shape 77"/>
-        <p:cNvGrpSpPr/>
-        <p:nvPr/>
-      </p:nvGrpSpPr>
-      <p:grpSpPr>
-        <a:xfrm>
-          <a:off x="0" y="0"/>
-          <a:ext cx="0" cy="0"/>
-          <a:chOff x="0" y="0"/>
-          <a:chExt cx="0" cy="0"/>
-        </a:xfrm>
-      </p:grpSpPr>
-      <p:sp>
-        <p:nvSpPr>
-          <p:cNvPr id="78" name="Google Shape;78;p5"/>
-          <p:cNvSpPr txBox="1"/>
-          <p:nvPr/>
-        </p:nvSpPr>
-        <p:spPr>
-          <a:xfrm>
-            <a:off x="1861050" y="103025"/>
-            <a:ext cx="5421900" cy="644100"/>
-          </a:xfrm>
-          <a:prstGeom prst="rect">
-            <a:avLst/>
-          </a:prstGeom>
-          <a:noFill/>
-          <a:ln>
-            <a:noFill/>
-          </a:ln>
-        </p:spPr>
-        <p:txBody>
-          <a:bodyPr anchorCtr="0" anchor="t" bIns="91425" lIns="91425" spcFirstLastPara="1" rIns="91425" wrap="square" tIns="91425">
-            <a:noAutofit/>
-          </a:bodyPr>
-          <a:lstStyle/>
-          <a:p>
-            <a:pPr indent="0" lvl="0" marL="0" marR="0" rtl="0" algn="ctr">
-              <a:lnSpc>
-                <a:spcPct val="100000"/>
-              </a:lnSpc>
-              <a:spcBef>
-                <a:spcPts val="0"/>
-              </a:spcBef>
-              <a:spcAft>
-                <a:spcPts val="0"/>
-              </a:spcAft>
-              <a:buClr>
-                <a:srgbClr val="000000"/>
-              </a:buClr>
-              <a:buSzPts val="1400"/>
-              <a:buFont typeface="Arial"/>
-              <a:buNone/>
-            </a:pPr>
-            <a:r>
-              <a:rPr b="0" i="0" lang="pt-BR" sz="1400" u="none" cap="none" strike="noStrike">
-                <a:solidFill>
-                  <a:srgbClr val="000000"/>
-                </a:solidFill>
-                <a:latin typeface="Arial"/>
-                <a:ea typeface="Arial"/>
-                <a:cs typeface="Arial"/>
-                <a:sym typeface="Arial"/>
-              </a:rPr>
-              <a:t>DFD ESSENCIAL</a:t>
-            </a:r>
-            <a:endParaRPr b="0" i="0" sz="1400" u="none" cap="none" strike="noStrike">
-              <a:solidFill>
-                <a:srgbClr val="000000"/>
-              </a:solidFill>
-              <a:latin typeface="Arial"/>
-              <a:ea typeface="Arial"/>
-              <a:cs typeface="Arial"/>
-              <a:sym typeface="Arial"/>
-            </a:endParaRPr>
-          </a:p>
-          <a:p>
-            <a:pPr indent="0" lvl="0" marL="0" marR="0" rtl="0" algn="ctr">
-              <a:lnSpc>
-                <a:spcPct val="100000"/>
-              </a:lnSpc>
-              <a:spcBef>
-                <a:spcPts val="0"/>
-              </a:spcBef>
-              <a:spcAft>
-                <a:spcPts val="0"/>
-              </a:spcAft>
-              <a:buClr>
-                <a:srgbClr val="000000"/>
-              </a:buClr>
-              <a:buSzPts val="1400"/>
-              <a:buFont typeface="Arial"/>
-              <a:buNone/>
-            </a:pPr>
-            <a:r>
-              <a:rPr b="0" i="0" lang="pt-BR" sz="1400" u="none" cap="none" strike="noStrike">
-                <a:solidFill>
-                  <a:srgbClr val="000000"/>
-                </a:solidFill>
-                <a:latin typeface="Arial"/>
-                <a:ea typeface="Arial"/>
-                <a:cs typeface="Arial"/>
-                <a:sym typeface="Arial"/>
-              </a:rPr>
-              <a:t>TRANSFERIR MATRÍCULA</a:t>
-            </a:r>
-            <a:endParaRPr b="0" i="0" sz="1400" u="none" cap="none" strike="noStrike">
-              <a:solidFill>
-                <a:srgbClr val="000000"/>
-              </a:solidFill>
-              <a:latin typeface="Arial"/>
-              <a:ea typeface="Arial"/>
-              <a:cs typeface="Arial"/>
-              <a:sym typeface="Arial"/>
-            </a:endParaRPr>
-          </a:p>
-        </p:txBody>
-      </p:sp>
-      <p:pic>
-        <p:nvPicPr>
-          <p:cNvPr id="79" name="Google Shape;79;p5"/>
-          <p:cNvPicPr preferRelativeResize="0"/>
-          <p:nvPr/>
-        </p:nvPicPr>
-        <p:blipFill>
-          <a:blip r:embed="rId3">
-            <a:alphaModFix/>
-          </a:blip>
-          <a:stretch>
-            <a:fillRect/>
-          </a:stretch>
-        </p:blipFill>
-        <p:spPr>
-          <a:xfrm>
-            <a:off x="2443163" y="985838"/>
-            <a:ext cx="4257675" cy="3171825"/>
+            <a:off x="152400" y="1184289"/>
+            <a:ext cx="8839200" cy="3689323"/>
           </a:xfrm>
           <a:prstGeom prst="rect">
             <a:avLst/>

</xml_diff>

<commit_message>
Correção dos artefatos Versão 2
</commit_message>
<xml_diff>
--- a/Artefatos/16. DFD ESSENCIAL CAPACIDADES.pptx
+++ b/Artefatos/16. DFD ESSENCIAL CAPACIDADES.pptx
@@ -8729,8 +8729,8 @@
         </p:blipFill>
         <p:spPr>
           <a:xfrm>
-            <a:off x="152400" y="1184289"/>
-            <a:ext cx="8839200" cy="3689323"/>
+            <a:off x="152400" y="993600"/>
+            <a:ext cx="8839200" cy="3698807"/>
           </a:xfrm>
           <a:prstGeom prst="rect">
             <a:avLst/>

</xml_diff>

<commit_message>
Atualização e Cenário Ministrar Aulas 16, 17, 18, 19, 20, 21 e 22
</commit_message>
<xml_diff>
--- a/Artefatos/16. DFD ESSENCIAL CAPACIDADES.pptx
+++ b/Artefatos/16. DFD ESSENCIAL CAPACIDADES.pptx
@@ -11,7 +11,7 @@
     <p:sldId id="256" r:id="rId2"/>
     <p:sldId id="257" r:id="rId3"/>
     <p:sldId id="258" r:id="rId4"/>
-    <p:sldId id="259" r:id="rId5"/>
+    <p:sldId id="261" r:id="rId5"/>
     <p:sldId id="260" r:id="rId6"/>
   </p:sldIdLst>
   <p:sldSz cx="9144000" cy="5143500" type="screen16x9"/>
@@ -8802,10 +8802,10 @@
       </p:sp>
       <p:pic>
         <p:nvPicPr>
-          <p:cNvPr id="4" name="Imagem 3" descr="Uma imagem contendo Interface gráfica do usuário&#10;&#10;Descrição gerada automaticamente">
+          <p:cNvPr id="3" name="Imagem 2" descr="Interface gráfica do usuário&#10;&#10;Descrição gerada automaticamente">
             <a:extLst>
               <a:ext uri="{FF2B5EF4-FFF2-40B4-BE49-F238E27FC236}">
-                <a16:creationId xmlns:a16="http://schemas.microsoft.com/office/drawing/2014/main" id="{C9600466-839F-4783-A9F3-2672334C764A}"/>
+                <a16:creationId xmlns:a16="http://schemas.microsoft.com/office/drawing/2014/main" id="{0B7C2607-AEDB-483F-9077-E591CBC3DCDC}"/>
               </a:ext>
             </a:extLst>
           </p:cNvPr>
@@ -8814,16 +8814,15 @@
           </p:cNvPicPr>
           <p:nvPr/>
         </p:nvPicPr>
-        <p:blipFill>
+        <p:blipFill rotWithShape="1">
           <a:blip r:embed="rId3"/>
-          <a:stretch>
-            <a:fillRect/>
-          </a:stretch>
+          <a:srcRect t="9096"/>
+          <a:stretch/>
         </p:blipFill>
         <p:spPr>
           <a:xfrm>
-            <a:off x="1041990" y="584791"/>
-            <a:ext cx="7060019" cy="4283328"/>
+            <a:off x="1127124" y="357025"/>
+            <a:ext cx="6889751" cy="4429449"/>
           </a:xfrm>
           <a:prstGeom prst="rect">
             <a:avLst/>
@@ -8855,35 +8854,6 @@
           <a:chExt cx="0" cy="0"/>
         </a:xfrm>
       </p:grpSpPr>
-      <p:pic>
-        <p:nvPicPr>
-          <p:cNvPr id="4" name="Imagem 3" descr="Interface gráfica do usuário&#10;&#10;Descrição gerada automaticamente">
-            <a:extLst>
-              <a:ext uri="{FF2B5EF4-FFF2-40B4-BE49-F238E27FC236}">
-                <a16:creationId xmlns:a16="http://schemas.microsoft.com/office/drawing/2014/main" id="{8C585B8E-5F9D-48CE-B6C5-73A786DDFD79}"/>
-              </a:ext>
-            </a:extLst>
-          </p:cNvPr>
-          <p:cNvPicPr>
-            <a:picLocks noChangeAspect="1"/>
-          </p:cNvPicPr>
-          <p:nvPr/>
-        </p:nvPicPr>
-        <p:blipFill rotWithShape="1">
-          <a:blip r:embed="rId2"/>
-          <a:srcRect t="13653"/>
-          <a:stretch/>
-        </p:blipFill>
-        <p:spPr>
-          <a:xfrm>
-            <a:off x="799164" y="1509823"/>
-            <a:ext cx="7972695" cy="2750156"/>
-          </a:xfrm>
-          <a:prstGeom prst="rect">
-            <a:avLst/>
-          </a:prstGeom>
-        </p:spPr>
-      </p:pic>
       <p:sp>
         <p:nvSpPr>
           <p:cNvPr id="5" name="Google Shape;54;p13">
@@ -8898,7 +8868,7 @@
         </p:nvSpPr>
         <p:spPr>
           <a:xfrm>
-            <a:off x="1318613" y="374930"/>
+            <a:off x="1318613" y="215441"/>
             <a:ext cx="6506773" cy="508591"/>
           </a:xfrm>
           <a:prstGeom prst="rect">
@@ -8965,6 +8935,35 @@
           </a:p>
         </p:txBody>
       </p:sp>
+      <p:pic>
+        <p:nvPicPr>
+          <p:cNvPr id="3" name="Imagem 2">
+            <a:extLst>
+              <a:ext uri="{FF2B5EF4-FFF2-40B4-BE49-F238E27FC236}">
+                <a16:creationId xmlns:a16="http://schemas.microsoft.com/office/drawing/2014/main" id="{E6796304-FF2F-429B-8775-7563F674D5DB}"/>
+              </a:ext>
+            </a:extLst>
+          </p:cNvPr>
+          <p:cNvPicPr>
+            <a:picLocks noChangeAspect="1"/>
+          </p:cNvPicPr>
+          <p:nvPr/>
+        </p:nvPicPr>
+        <p:blipFill rotWithShape="1">
+          <a:blip r:embed="rId2"/>
+          <a:srcRect t="9281" r="87363" b="-1726"/>
+          <a:stretch/>
+        </p:blipFill>
+        <p:spPr>
+          <a:xfrm>
+            <a:off x="1189267" y="515753"/>
+            <a:ext cx="6943060" cy="4412306"/>
+          </a:xfrm>
+          <a:prstGeom prst="rect">
+            <a:avLst/>
+          </a:prstGeom>
+        </p:spPr>
+      </p:pic>
     </p:spTree>
     <p:extLst>
       <p:ext uri="{BB962C8B-B14F-4D97-AF65-F5344CB8AC3E}">
@@ -9078,10 +9077,10 @@
       </p:sp>
       <p:pic>
         <p:nvPicPr>
-          <p:cNvPr id="5" name="Imagem 4" descr="Interface gráfica do usuário, Aplicativo&#10;&#10;Descrição gerada automaticamente">
+          <p:cNvPr id="4" name="Imagem 3" descr="Linha do tempo&#10;&#10;Descrição gerada automaticamente">
             <a:extLst>
               <a:ext uri="{FF2B5EF4-FFF2-40B4-BE49-F238E27FC236}">
-                <a16:creationId xmlns:a16="http://schemas.microsoft.com/office/drawing/2014/main" id="{F2F46A29-C4CE-446F-A19C-C0C51201BBF8}"/>
+                <a16:creationId xmlns:a16="http://schemas.microsoft.com/office/drawing/2014/main" id="{DCA37C38-A128-4F5A-B5B0-F63AC74A48A0}"/>
               </a:ext>
             </a:extLst>
           </p:cNvPr>
@@ -9092,13 +9091,13 @@
         </p:nvPicPr>
         <p:blipFill rotWithShape="1">
           <a:blip r:embed="rId2"/>
-          <a:srcRect t="15945"/>
+          <a:srcRect t="14924"/>
           <a:stretch/>
         </p:blipFill>
         <p:spPr>
           <a:xfrm>
-            <a:off x="2243081" y="1216582"/>
-            <a:ext cx="4657836" cy="3381556"/>
+            <a:off x="767333" y="1105788"/>
+            <a:ext cx="7816628" cy="3500348"/>
           </a:xfrm>
           <a:prstGeom prst="rect">
             <a:avLst/>
@@ -9137,10 +9136,10 @@
       </p:grpSpPr>
       <p:sp>
         <p:nvSpPr>
-          <p:cNvPr id="3" name="Google Shape;54;p13">
+          <p:cNvPr id="4" name="Google Shape;54;p13">
             <a:extLst>
               <a:ext uri="{FF2B5EF4-FFF2-40B4-BE49-F238E27FC236}">
-                <a16:creationId xmlns:a16="http://schemas.microsoft.com/office/drawing/2014/main" id="{AA883E4E-D1B2-43E0-A7BA-8699E59A981A}"/>
+                <a16:creationId xmlns:a16="http://schemas.microsoft.com/office/drawing/2014/main" id="{D573561D-73DC-4BB0-9BFA-3A077BB6C437}"/>
               </a:ext>
             </a:extLst>
           </p:cNvPr>
@@ -9218,10 +9217,10 @@
       </p:sp>
       <p:pic>
         <p:nvPicPr>
-          <p:cNvPr id="5" name="Imagem 4" descr="Uma imagem contendo Interface gráfica do usuário&#10;&#10;Descrição gerada automaticamente">
+          <p:cNvPr id="6" name="Imagem 5" descr="Uma imagem contendo Interface gráfica do usuário&#10;&#10;Descrição gerada automaticamente">
             <a:extLst>
               <a:ext uri="{FF2B5EF4-FFF2-40B4-BE49-F238E27FC236}">
-                <a16:creationId xmlns:a16="http://schemas.microsoft.com/office/drawing/2014/main" id="{A1A31082-7EFD-4044-9BDD-1DDBFCCC5053}"/>
+                <a16:creationId xmlns:a16="http://schemas.microsoft.com/office/drawing/2014/main" id="{04B6A86B-AB41-4608-9D73-F479951CA00E}"/>
               </a:ext>
             </a:extLst>
           </p:cNvPr>
@@ -9232,13 +9231,13 @@
         </p:nvPicPr>
         <p:blipFill rotWithShape="1">
           <a:blip r:embed="rId2"/>
-          <a:srcRect t="13531"/>
+          <a:srcRect t="15517"/>
           <a:stretch/>
         </p:blipFill>
         <p:spPr>
           <a:xfrm>
-            <a:off x="2062716" y="1178602"/>
-            <a:ext cx="5018568" cy="3412642"/>
+            <a:off x="2057122" y="1322722"/>
+            <a:ext cx="5029754" cy="3037733"/>
           </a:xfrm>
           <a:prstGeom prst="rect">
             <a:avLst/>
@@ -9248,7 +9247,7 @@
     </p:spTree>
     <p:extLst>
       <p:ext uri="{BB962C8B-B14F-4D97-AF65-F5344CB8AC3E}">
-        <p14:creationId xmlns:p14="http://schemas.microsoft.com/office/powerpoint/2010/main" val="4007732069"/>
+        <p14:creationId xmlns:p14="http://schemas.microsoft.com/office/powerpoint/2010/main" val="3437676399"/>
       </p:ext>
     </p:extLst>
   </p:cSld>
@@ -9358,10 +9357,10 @@
       </p:sp>
       <p:pic>
         <p:nvPicPr>
-          <p:cNvPr id="5" name="Imagem 4" descr="Interface gráfica do usuário, Aplicativo&#10;&#10;Descrição gerada automaticamente">
+          <p:cNvPr id="4" name="Imagem 3" descr="Interface gráfica do usuário&#10;&#10;Descrição gerada automaticamente">
             <a:extLst>
               <a:ext uri="{FF2B5EF4-FFF2-40B4-BE49-F238E27FC236}">
-                <a16:creationId xmlns:a16="http://schemas.microsoft.com/office/drawing/2014/main" id="{5C275E48-1873-4CC6-81A2-766959A933A9}"/>
+                <a16:creationId xmlns:a16="http://schemas.microsoft.com/office/drawing/2014/main" id="{8404D0D3-5A83-4E47-969A-7782A842B269}"/>
               </a:ext>
             </a:extLst>
           </p:cNvPr>
@@ -9370,16 +9369,15 @@
           </p:cNvPicPr>
           <p:nvPr/>
         </p:nvPicPr>
-        <p:blipFill>
+        <p:blipFill rotWithShape="1">
           <a:blip r:embed="rId2"/>
-          <a:stretch>
-            <a:fillRect/>
-          </a:stretch>
+          <a:srcRect t="12079"/>
+          <a:stretch/>
         </p:blipFill>
         <p:spPr>
           <a:xfrm>
-            <a:off x="2051419" y="1128879"/>
-            <a:ext cx="5338874" cy="3288816"/>
+            <a:off x="1861085" y="1116398"/>
+            <a:ext cx="5421830" cy="3510647"/>
           </a:xfrm>
           <a:prstGeom prst="rect">
             <a:avLst/>

</xml_diff>

<commit_message>
Últimos ajustes nos artefatos
</commit_message>
<xml_diff>
--- a/Artefatos/16. DFD ESSENCIAL CAPACIDADES.pptx
+++ b/Artefatos/16. DFD ESSENCIAL CAPACIDADES.pptx
@@ -8937,10 +8937,10 @@
       </p:sp>
       <p:pic>
         <p:nvPicPr>
-          <p:cNvPr id="3" name="Imagem 2">
+          <p:cNvPr id="4" name="Imagem 3">
             <a:extLst>
               <a:ext uri="{FF2B5EF4-FFF2-40B4-BE49-F238E27FC236}">
-                <a16:creationId xmlns:a16="http://schemas.microsoft.com/office/drawing/2014/main" id="{E6796304-FF2F-429B-8775-7563F674D5DB}"/>
+                <a16:creationId xmlns:a16="http://schemas.microsoft.com/office/drawing/2014/main" id="{3D8419CA-5CBA-4F50-8AB3-A57DCF38E9A2}"/>
               </a:ext>
             </a:extLst>
           </p:cNvPr>
@@ -8951,13 +8951,13 @@
         </p:nvPicPr>
         <p:blipFill rotWithShape="1">
           <a:blip r:embed="rId2"/>
-          <a:srcRect t="9281" r="87363" b="-1726"/>
+          <a:srcRect r="87562"/>
           <a:stretch/>
         </p:blipFill>
         <p:spPr>
           <a:xfrm>
-            <a:off x="1189267" y="515753"/>
-            <a:ext cx="6943060" cy="4412306"/>
+            <a:off x="914752" y="724032"/>
+            <a:ext cx="7070300" cy="4407838"/>
           </a:xfrm>
           <a:prstGeom prst="rect">
             <a:avLst/>

</xml_diff>

<commit_message>
Correção dos Artefatos AC05 (Engenharia de Requisitos)1 ao 23
</commit_message>
<xml_diff>
--- a/Artefatos/16. DFD ESSENCIAL CAPACIDADES.pptx
+++ b/Artefatos/16. DFD ESSENCIAL CAPACIDADES.pptx
@@ -8802,10 +8802,10 @@
       </p:sp>
       <p:pic>
         <p:nvPicPr>
-          <p:cNvPr id="3" name="Imagem 2" descr="Interface gráfica do usuário&#10;&#10;Descrição gerada automaticamente">
+          <p:cNvPr id="4" name="Imagem 3" descr="Interface gráfica do usuário&#10;&#10;Descrição gerada automaticamente">
             <a:extLst>
               <a:ext uri="{FF2B5EF4-FFF2-40B4-BE49-F238E27FC236}">
-                <a16:creationId xmlns:a16="http://schemas.microsoft.com/office/drawing/2014/main" id="{0B7C2607-AEDB-483F-9077-E591CBC3DCDC}"/>
+                <a16:creationId xmlns:a16="http://schemas.microsoft.com/office/drawing/2014/main" id="{E471ED6D-4963-47AC-B050-0F108E94651B}"/>
               </a:ext>
             </a:extLst>
           </p:cNvPr>
@@ -8814,15 +8814,16 @@
           </p:cNvPicPr>
           <p:nvPr/>
         </p:nvPicPr>
-        <p:blipFill rotWithShape="1">
+        <p:blipFill>
           <a:blip r:embed="rId3"/>
-          <a:srcRect t="9096"/>
-          <a:stretch/>
+          <a:stretch>
+            <a:fillRect/>
+          </a:stretch>
         </p:blipFill>
         <p:spPr>
           <a:xfrm>
-            <a:off x="1127124" y="357025"/>
-            <a:ext cx="6889751" cy="4429449"/>
+            <a:off x="1531186" y="658892"/>
+            <a:ext cx="6081626" cy="3825716"/>
           </a:xfrm>
           <a:prstGeom prst="rect">
             <a:avLst/>
@@ -9077,10 +9078,10 @@
       </p:sp>
       <p:pic>
         <p:nvPicPr>
-          <p:cNvPr id="4" name="Imagem 3" descr="Linha do tempo&#10;&#10;Descrição gerada automaticamente">
+          <p:cNvPr id="5" name="Imagem 4">
             <a:extLst>
               <a:ext uri="{FF2B5EF4-FFF2-40B4-BE49-F238E27FC236}">
-                <a16:creationId xmlns:a16="http://schemas.microsoft.com/office/drawing/2014/main" id="{DCA37C38-A128-4F5A-B5B0-F63AC74A48A0}"/>
+                <a16:creationId xmlns:a16="http://schemas.microsoft.com/office/drawing/2014/main" id="{6DB81387-AC55-4590-A019-9DC5746F962E}"/>
               </a:ext>
             </a:extLst>
           </p:cNvPr>
@@ -9089,15 +9090,16 @@
           </p:cNvPicPr>
           <p:nvPr/>
         </p:nvPicPr>
-        <p:blipFill rotWithShape="1">
+        <p:blipFill>
           <a:blip r:embed="rId2"/>
-          <a:srcRect t="14924"/>
-          <a:stretch/>
+          <a:stretch>
+            <a:fillRect/>
+          </a:stretch>
         </p:blipFill>
         <p:spPr>
           <a:xfrm>
-            <a:off x="767333" y="1105788"/>
-            <a:ext cx="7816628" cy="3500348"/>
+            <a:off x="622908" y="1134723"/>
+            <a:ext cx="7898184" cy="3361077"/>
           </a:xfrm>
           <a:prstGeom prst="rect">
             <a:avLst/>
@@ -9217,10 +9219,10 @@
       </p:sp>
       <p:pic>
         <p:nvPicPr>
-          <p:cNvPr id="6" name="Imagem 5" descr="Uma imagem contendo Interface gráfica do usuário&#10;&#10;Descrição gerada automaticamente">
+          <p:cNvPr id="3" name="Imagem 2" descr="Interface gráfica do usuário, Aplicativo&#10;&#10;Descrição gerada automaticamente">
             <a:extLst>
               <a:ext uri="{FF2B5EF4-FFF2-40B4-BE49-F238E27FC236}">
-                <a16:creationId xmlns:a16="http://schemas.microsoft.com/office/drawing/2014/main" id="{04B6A86B-AB41-4608-9D73-F479951CA00E}"/>
+                <a16:creationId xmlns:a16="http://schemas.microsoft.com/office/drawing/2014/main" id="{8B8FCEE2-B5EF-473C-916D-4823F975BEE1}"/>
               </a:ext>
             </a:extLst>
           </p:cNvPr>
@@ -9229,15 +9231,16 @@
           </p:cNvPicPr>
           <p:nvPr/>
         </p:nvPicPr>
-        <p:blipFill rotWithShape="1">
+        <p:blipFill>
           <a:blip r:embed="rId2"/>
-          <a:srcRect t="15517"/>
-          <a:stretch/>
+          <a:stretch>
+            <a:fillRect/>
+          </a:stretch>
         </p:blipFill>
         <p:spPr>
           <a:xfrm>
-            <a:off x="2057122" y="1322722"/>
-            <a:ext cx="5029754" cy="3037733"/>
+            <a:off x="1611638" y="1318437"/>
+            <a:ext cx="6213748" cy="3526021"/>
           </a:xfrm>
           <a:prstGeom prst="rect">
             <a:avLst/>
@@ -9357,10 +9360,10 @@
       </p:sp>
       <p:pic>
         <p:nvPicPr>
-          <p:cNvPr id="4" name="Imagem 3" descr="Interface gráfica do usuário&#10;&#10;Descrição gerada automaticamente">
+          <p:cNvPr id="5" name="Imagem 4" descr="Interface gráfica do usuário&#10;&#10;Descrição gerada automaticamente">
             <a:extLst>
               <a:ext uri="{FF2B5EF4-FFF2-40B4-BE49-F238E27FC236}">
-                <a16:creationId xmlns:a16="http://schemas.microsoft.com/office/drawing/2014/main" id="{8404D0D3-5A83-4E47-969A-7782A842B269}"/>
+                <a16:creationId xmlns:a16="http://schemas.microsoft.com/office/drawing/2014/main" id="{FD291330-6E75-4317-A32B-E608F1CFC34D}"/>
               </a:ext>
             </a:extLst>
           </p:cNvPr>
@@ -9369,15 +9372,16 @@
           </p:cNvPicPr>
           <p:nvPr/>
         </p:nvPicPr>
-        <p:blipFill rotWithShape="1">
+        <p:blipFill>
           <a:blip r:embed="rId2"/>
-          <a:srcRect t="12079"/>
-          <a:stretch/>
+          <a:stretch>
+            <a:fillRect/>
+          </a:stretch>
         </p:blipFill>
         <p:spPr>
           <a:xfrm>
-            <a:off x="1861085" y="1116398"/>
-            <a:ext cx="5421830" cy="3510647"/>
+            <a:off x="1616537" y="1356772"/>
+            <a:ext cx="5910926" cy="3600213"/>
           </a:xfrm>
           <a:prstGeom prst="rect">
             <a:avLst/>

</xml_diff>